<commit_message>
enabled regular model to handel cellular structures
</commit_message>
<xml_diff>
--- a/examples/cellular/energy_system.pptx
+++ b/examples/cellular/energy_system.pptx
@@ -5,7 +5,8 @@
     <p:sldMasterId id="2147483648" r:id="rId1"/>
   </p:sldMasterIdLst>
   <p:sldIdLst>
-    <p:sldId id="257" r:id="rId2"/>
+    <p:sldId id="260" r:id="rId2"/>
+    <p:sldId id="261" r:id="rId3"/>
   </p:sldIdLst>
   <p:sldSz cx="12192000" cy="6858000"/>
   <p:notesSz cx="6858000" cy="9144000"/>
@@ -104,6 +105,11 @@
       </a:defRPr>
     </a:lvl9pPr>
   </p:defaultTextStyle>
+  <p:extLst>
+    <p:ext uri="{EFAFB233-063F-42B5-8137-9DF3F51BA10A}">
+      <p15:sldGuideLst xmlns:p15="http://schemas.microsoft.com/office/powerpoint/2012/main"/>
+    </p:ext>
+  </p:extLst>
 </p:presentation>
 </file>
 
@@ -254,7 +260,7 @@
           <a:p>
             <a:fld id="{043F729B-C5C2-42F2-A4A7-A0F9FF7DFD67}" type="datetimeFigureOut">
               <a:rPr lang="de-DE" smtClean="0"/>
-              <a:t>21.01.2023</a:t>
+              <a:t>18.05.2023</a:t>
             </a:fld>
             <a:endParaRPr lang="de-DE"/>
           </a:p>
@@ -452,7 +458,7 @@
           <a:p>
             <a:fld id="{043F729B-C5C2-42F2-A4A7-A0F9FF7DFD67}" type="datetimeFigureOut">
               <a:rPr lang="de-DE" smtClean="0"/>
-              <a:t>21.01.2023</a:t>
+              <a:t>18.05.2023</a:t>
             </a:fld>
             <a:endParaRPr lang="de-DE"/>
           </a:p>
@@ -660,7 +666,7 @@
           <a:p>
             <a:fld id="{043F729B-C5C2-42F2-A4A7-A0F9FF7DFD67}" type="datetimeFigureOut">
               <a:rPr lang="de-DE" smtClean="0"/>
-              <a:t>21.01.2023</a:t>
+              <a:t>18.05.2023</a:t>
             </a:fld>
             <a:endParaRPr lang="de-DE"/>
           </a:p>
@@ -858,7 +864,7 @@
           <a:p>
             <a:fld id="{043F729B-C5C2-42F2-A4A7-A0F9FF7DFD67}" type="datetimeFigureOut">
               <a:rPr lang="de-DE" smtClean="0"/>
-              <a:t>21.01.2023</a:t>
+              <a:t>18.05.2023</a:t>
             </a:fld>
             <a:endParaRPr lang="de-DE"/>
           </a:p>
@@ -1133,7 +1139,7 @@
           <a:p>
             <a:fld id="{043F729B-C5C2-42F2-A4A7-A0F9FF7DFD67}" type="datetimeFigureOut">
               <a:rPr lang="de-DE" smtClean="0"/>
-              <a:t>21.01.2023</a:t>
+              <a:t>18.05.2023</a:t>
             </a:fld>
             <a:endParaRPr lang="de-DE"/>
           </a:p>
@@ -1398,7 +1404,7 @@
           <a:p>
             <a:fld id="{043F729B-C5C2-42F2-A4A7-A0F9FF7DFD67}" type="datetimeFigureOut">
               <a:rPr lang="de-DE" smtClean="0"/>
-              <a:t>21.01.2023</a:t>
+              <a:t>18.05.2023</a:t>
             </a:fld>
             <a:endParaRPr lang="de-DE"/>
           </a:p>
@@ -1810,7 +1816,7 @@
           <a:p>
             <a:fld id="{043F729B-C5C2-42F2-A4A7-A0F9FF7DFD67}" type="datetimeFigureOut">
               <a:rPr lang="de-DE" smtClean="0"/>
-              <a:t>21.01.2023</a:t>
+              <a:t>18.05.2023</a:t>
             </a:fld>
             <a:endParaRPr lang="de-DE"/>
           </a:p>
@@ -1951,7 +1957,7 @@
           <a:p>
             <a:fld id="{043F729B-C5C2-42F2-A4A7-A0F9FF7DFD67}" type="datetimeFigureOut">
               <a:rPr lang="de-DE" smtClean="0"/>
-              <a:t>21.01.2023</a:t>
+              <a:t>18.05.2023</a:t>
             </a:fld>
             <a:endParaRPr lang="de-DE"/>
           </a:p>
@@ -2064,7 +2070,7 @@
           <a:p>
             <a:fld id="{043F729B-C5C2-42F2-A4A7-A0F9FF7DFD67}" type="datetimeFigureOut">
               <a:rPr lang="de-DE" smtClean="0"/>
-              <a:t>21.01.2023</a:t>
+              <a:t>18.05.2023</a:t>
             </a:fld>
             <a:endParaRPr lang="de-DE"/>
           </a:p>
@@ -2375,7 +2381,7 @@
           <a:p>
             <a:fld id="{043F729B-C5C2-42F2-A4A7-A0F9FF7DFD67}" type="datetimeFigureOut">
               <a:rPr lang="de-DE" smtClean="0"/>
-              <a:t>21.01.2023</a:t>
+              <a:t>18.05.2023</a:t>
             </a:fld>
             <a:endParaRPr lang="de-DE"/>
           </a:p>
@@ -2663,7 +2669,7 @@
           <a:p>
             <a:fld id="{043F729B-C5C2-42F2-A4A7-A0F9FF7DFD67}" type="datetimeFigureOut">
               <a:rPr lang="de-DE" smtClean="0"/>
-              <a:t>21.01.2023</a:t>
+              <a:t>18.05.2023</a:t>
             </a:fld>
             <a:endParaRPr lang="de-DE"/>
           </a:p>
@@ -2904,7 +2910,7 @@
           <a:p>
             <a:fld id="{043F729B-C5C2-42F2-A4A7-A0F9FF7DFD67}" type="datetimeFigureOut">
               <a:rPr lang="de-DE" smtClean="0"/>
-              <a:t>21.01.2023</a:t>
+              <a:t>18.05.2023</a:t>
             </a:fld>
             <a:endParaRPr lang="de-DE"/>
           </a:p>
@@ -3323,862 +3329,42 @@
       </p:grpSpPr>
       <p:sp>
         <p:nvSpPr>
-          <p:cNvPr id="4" name="Rechteck 3">
-            <a:extLst>
-              <a:ext uri="{FF2B5EF4-FFF2-40B4-BE49-F238E27FC236}">
-                <a16:creationId xmlns:a16="http://schemas.microsoft.com/office/drawing/2014/main" id="{BDBD0EC3-6543-3640-D243-A36BD18257BA}"/>
-              </a:ext>
-            </a:extLst>
-          </p:cNvPr>
-          <p:cNvSpPr/>
-          <p:nvPr/>
-        </p:nvSpPr>
-        <p:spPr>
-          <a:xfrm>
-            <a:off x="1562100" y="371475"/>
-            <a:ext cx="9286875" cy="5838825"/>
-          </a:xfrm>
-          <a:prstGeom prst="rect">
-            <a:avLst/>
-          </a:prstGeom>
-          <a:noFill/>
-        </p:spPr>
-        <p:style>
-          <a:lnRef idx="2">
-            <a:schemeClr val="accent1">
-              <a:shade val="50000"/>
-            </a:schemeClr>
-          </a:lnRef>
-          <a:fillRef idx="1">
-            <a:schemeClr val="accent1"/>
-          </a:fillRef>
-          <a:effectRef idx="0">
-            <a:schemeClr val="accent1"/>
-          </a:effectRef>
-          <a:fontRef idx="minor">
-            <a:schemeClr val="lt1"/>
-          </a:fontRef>
-        </p:style>
-        <p:txBody>
-          <a:bodyPr rtlCol="0" anchor="t"/>
-          <a:lstStyle/>
-          <a:p>
-            <a:pPr algn="ctr"/>
-            <a:r>
-              <a:rPr lang="de-DE" dirty="0">
-                <a:solidFill>
-                  <a:schemeClr val="tx1"/>
-                </a:solidFill>
-              </a:rPr>
-              <a:t>es</a:t>
-            </a:r>
-          </a:p>
-        </p:txBody>
-      </p:sp>
-      <p:sp>
-        <p:nvSpPr>
-          <p:cNvPr id="5" name="Ellipse 4">
-            <a:extLst>
-              <a:ext uri="{FF2B5EF4-FFF2-40B4-BE49-F238E27FC236}">
-                <a16:creationId xmlns:a16="http://schemas.microsoft.com/office/drawing/2014/main" id="{96BB79D0-A52F-665F-FD4D-CC47DE32563B}"/>
-              </a:ext>
-            </a:extLst>
-          </p:cNvPr>
-          <p:cNvSpPr/>
-          <p:nvPr/>
-        </p:nvSpPr>
-        <p:spPr>
-          <a:xfrm>
-            <a:off x="4435391" y="2728817"/>
-            <a:ext cx="5917533" cy="1791197"/>
-          </a:xfrm>
-          <a:prstGeom prst="ellipse">
-            <a:avLst/>
-          </a:prstGeom>
-        </p:spPr>
-        <p:style>
-          <a:lnRef idx="2">
-            <a:schemeClr val="accent1">
-              <a:shade val="50000"/>
-            </a:schemeClr>
-          </a:lnRef>
-          <a:fillRef idx="1">
-            <a:schemeClr val="accent1"/>
-          </a:fillRef>
-          <a:effectRef idx="0">
-            <a:schemeClr val="accent1"/>
-          </a:effectRef>
-          <a:fontRef idx="minor">
-            <a:schemeClr val="lt1"/>
-          </a:fontRef>
-        </p:style>
-        <p:txBody>
-          <a:bodyPr rtlCol="0" anchor="t"/>
-          <a:lstStyle/>
-          <a:p>
-            <a:pPr algn="ctr"/>
+          <p:cNvPr id="2" name="Titel 1">
+            <a:extLst>
+              <a:ext uri="{FF2B5EF4-FFF2-40B4-BE49-F238E27FC236}">
+                <a16:creationId xmlns:a16="http://schemas.microsoft.com/office/drawing/2014/main" id="{BB3CB9CB-CF6E-3EBE-DC02-F29B6DE47F90}"/>
+              </a:ext>
+            </a:extLst>
+          </p:cNvPr>
+          <p:cNvSpPr>
+            <a:spLocks noGrp="1"/>
+          </p:cNvSpPr>
+          <p:nvPr>
+            <p:ph type="title"/>
+          </p:nvPr>
+        </p:nvSpPr>
+        <p:spPr/>
+        <p:txBody>
+          <a:bodyPr/>
+          <a:lstStyle/>
+          <a:p>
+            <a:r>
+              <a:rPr lang="de-DE" dirty="0" err="1"/>
+              <a:t>Cell</a:t>
+            </a:r>
             <a:r>
               <a:rPr lang="de-DE" dirty="0"/>
-              <a:t>ec1</a:t>
-            </a:r>
-          </a:p>
-        </p:txBody>
-      </p:sp>
-      <p:sp>
-        <p:nvSpPr>
-          <p:cNvPr id="8" name="Ellipse 7">
-            <a:extLst>
-              <a:ext uri="{FF2B5EF4-FFF2-40B4-BE49-F238E27FC236}">
-                <a16:creationId xmlns:a16="http://schemas.microsoft.com/office/drawing/2014/main" id="{AE163C8E-6F7F-ABCD-64A8-A1FFFF382B13}"/>
-              </a:ext>
-            </a:extLst>
-          </p:cNvPr>
-          <p:cNvSpPr/>
-          <p:nvPr/>
-        </p:nvSpPr>
-        <p:spPr>
-          <a:xfrm>
-            <a:off x="4420855" y="4555359"/>
-            <a:ext cx="2919664" cy="1427747"/>
-          </a:xfrm>
-          <a:prstGeom prst="ellipse">
-            <a:avLst/>
-          </a:prstGeom>
-        </p:spPr>
-        <p:style>
-          <a:lnRef idx="2">
-            <a:schemeClr val="accent1">
-              <a:shade val="50000"/>
-            </a:schemeClr>
-          </a:lnRef>
-          <a:fillRef idx="1">
-            <a:schemeClr val="accent1"/>
-          </a:fillRef>
-          <a:effectRef idx="0">
-            <a:schemeClr val="accent1"/>
-          </a:effectRef>
-          <a:fontRef idx="minor">
-            <a:schemeClr val="lt1"/>
-          </a:fontRef>
-        </p:style>
-        <p:txBody>
-          <a:bodyPr rtlCol="0" anchor="t"/>
-          <a:lstStyle/>
-          <a:p>
-            <a:pPr algn="ctr"/>
-            <a:r>
-              <a:rPr lang="de-DE" dirty="0"/>
-              <a:t>ec2</a:t>
-            </a:r>
-          </a:p>
-        </p:txBody>
-      </p:sp>
-      <p:sp>
-        <p:nvSpPr>
-          <p:cNvPr id="9" name="Ellipse 8">
-            <a:extLst>
-              <a:ext uri="{FF2B5EF4-FFF2-40B4-BE49-F238E27FC236}">
-                <a16:creationId xmlns:a16="http://schemas.microsoft.com/office/drawing/2014/main" id="{698F1381-3396-5B1F-9459-D2F8A227529F}"/>
-              </a:ext>
-            </a:extLst>
-          </p:cNvPr>
-          <p:cNvSpPr/>
-          <p:nvPr/>
-        </p:nvSpPr>
-        <p:spPr>
-          <a:xfrm>
-            <a:off x="7471596" y="4546838"/>
-            <a:ext cx="2919664" cy="1427747"/>
-          </a:xfrm>
-          <a:prstGeom prst="ellipse">
-            <a:avLst/>
-          </a:prstGeom>
-        </p:spPr>
-        <p:style>
-          <a:lnRef idx="2">
-            <a:schemeClr val="accent1">
-              <a:shade val="50000"/>
-            </a:schemeClr>
-          </a:lnRef>
-          <a:fillRef idx="1">
-            <a:schemeClr val="accent1"/>
-          </a:fillRef>
-          <a:effectRef idx="0">
-            <a:schemeClr val="accent1"/>
-          </a:effectRef>
-          <a:fontRef idx="minor">
-            <a:schemeClr val="lt1"/>
-          </a:fontRef>
-        </p:style>
-        <p:txBody>
-          <a:bodyPr rtlCol="0" anchor="t"/>
-          <a:lstStyle/>
-          <a:p>
-            <a:pPr algn="ctr"/>
-            <a:r>
-              <a:rPr lang="de-DE" dirty="0"/>
-              <a:t>ec3</a:t>
-            </a:r>
-          </a:p>
-        </p:txBody>
-      </p:sp>
-      <p:sp>
-        <p:nvSpPr>
-          <p:cNvPr id="10" name="Trapezoid 9">
-            <a:extLst>
-              <a:ext uri="{FF2B5EF4-FFF2-40B4-BE49-F238E27FC236}">
-                <a16:creationId xmlns:a16="http://schemas.microsoft.com/office/drawing/2014/main" id="{231CE316-C847-92BA-6767-50B16BB29F22}"/>
-              </a:ext>
-            </a:extLst>
-          </p:cNvPr>
-          <p:cNvSpPr/>
-          <p:nvPr/>
-        </p:nvSpPr>
-        <p:spPr>
-          <a:xfrm>
-            <a:off x="5422359" y="4000406"/>
-            <a:ext cx="561474" cy="208547"/>
-          </a:xfrm>
-          <a:prstGeom prst="trapezoid">
-            <a:avLst/>
-          </a:prstGeom>
-          <a:solidFill>
-            <a:srgbClr val="FFC000"/>
-          </a:solidFill>
-          <a:ln>
-            <a:solidFill>
-              <a:srgbClr val="FFC000"/>
-            </a:solidFill>
-          </a:ln>
-        </p:spPr>
-        <p:style>
-          <a:lnRef idx="2">
-            <a:schemeClr val="accent1">
-              <a:shade val="50000"/>
-            </a:schemeClr>
-          </a:lnRef>
-          <a:fillRef idx="1">
-            <a:schemeClr val="accent1"/>
-          </a:fillRef>
-          <a:effectRef idx="0">
-            <a:schemeClr val="accent1"/>
-          </a:effectRef>
-          <a:fontRef idx="minor">
-            <a:schemeClr val="lt1"/>
-          </a:fontRef>
-        </p:style>
-        <p:txBody>
-          <a:bodyPr rtlCol="0" anchor="ctr"/>
-          <a:lstStyle/>
-          <a:p>
-            <a:pPr algn="ctr"/>
-            <a:r>
-              <a:rPr lang="de-DE" sz="800" dirty="0">
-                <a:solidFill>
-                  <a:schemeClr val="tx1"/>
-                </a:solidFill>
-              </a:rPr>
-              <a:t>Dem_1</a:t>
-            </a:r>
-          </a:p>
-        </p:txBody>
-      </p:sp>
-      <p:sp>
-        <p:nvSpPr>
-          <p:cNvPr id="11" name="Trapezoid 10">
-            <a:extLst>
-              <a:ext uri="{FF2B5EF4-FFF2-40B4-BE49-F238E27FC236}">
-                <a16:creationId xmlns:a16="http://schemas.microsoft.com/office/drawing/2014/main" id="{B2C0F048-6B43-AD7B-A7DB-191649B2197C}"/>
-              </a:ext>
-            </a:extLst>
-          </p:cNvPr>
-          <p:cNvSpPr/>
-          <p:nvPr/>
-        </p:nvSpPr>
-        <p:spPr>
-          <a:xfrm>
-            <a:off x="8739734" y="5674797"/>
-            <a:ext cx="561474" cy="208547"/>
-          </a:xfrm>
-          <a:prstGeom prst="trapezoid">
-            <a:avLst/>
-          </a:prstGeom>
-          <a:solidFill>
-            <a:srgbClr val="FFC000"/>
-          </a:solidFill>
-          <a:ln>
-            <a:solidFill>
-              <a:srgbClr val="FFC000"/>
-            </a:solidFill>
-          </a:ln>
-        </p:spPr>
-        <p:style>
-          <a:lnRef idx="2">
-            <a:schemeClr val="accent1">
-              <a:shade val="50000"/>
-            </a:schemeClr>
-          </a:lnRef>
-          <a:fillRef idx="1">
-            <a:schemeClr val="accent1"/>
-          </a:fillRef>
-          <a:effectRef idx="0">
-            <a:schemeClr val="accent1"/>
-          </a:effectRef>
-          <a:fontRef idx="minor">
-            <a:schemeClr val="lt1"/>
-          </a:fontRef>
-        </p:style>
-        <p:txBody>
-          <a:bodyPr rtlCol="0" anchor="ctr"/>
-          <a:lstStyle/>
-          <a:p>
-            <a:pPr algn="ctr"/>
-            <a:r>
-              <a:rPr lang="de-DE" sz="800" dirty="0">
-                <a:solidFill>
-                  <a:schemeClr val="tx1"/>
-                </a:solidFill>
-              </a:rPr>
-              <a:t>Dem_1</a:t>
-            </a:r>
-          </a:p>
-        </p:txBody>
-      </p:sp>
-      <p:sp>
-        <p:nvSpPr>
-          <p:cNvPr id="12" name="Trapezoid 11">
-            <a:extLst>
-              <a:ext uri="{FF2B5EF4-FFF2-40B4-BE49-F238E27FC236}">
-                <a16:creationId xmlns:a16="http://schemas.microsoft.com/office/drawing/2014/main" id="{E2712A78-7D19-26A0-B82C-6A8E002186DC}"/>
-              </a:ext>
-            </a:extLst>
-          </p:cNvPr>
-          <p:cNvSpPr/>
-          <p:nvPr/>
-        </p:nvSpPr>
-        <p:spPr>
-          <a:xfrm>
-            <a:off x="5599950" y="5693344"/>
-            <a:ext cx="561474" cy="208547"/>
-          </a:xfrm>
-          <a:prstGeom prst="trapezoid">
-            <a:avLst/>
-          </a:prstGeom>
-          <a:solidFill>
-            <a:srgbClr val="FFC000"/>
-          </a:solidFill>
-          <a:ln>
-            <a:solidFill>
-              <a:srgbClr val="FFC000"/>
-            </a:solidFill>
-          </a:ln>
-        </p:spPr>
-        <p:style>
-          <a:lnRef idx="2">
-            <a:schemeClr val="accent1">
-              <a:shade val="50000"/>
-            </a:schemeClr>
-          </a:lnRef>
-          <a:fillRef idx="1">
-            <a:schemeClr val="accent1"/>
-          </a:fillRef>
-          <a:effectRef idx="0">
-            <a:schemeClr val="accent1"/>
-          </a:effectRef>
-          <a:fontRef idx="minor">
-            <a:schemeClr val="lt1"/>
-          </a:fontRef>
-        </p:style>
-        <p:txBody>
-          <a:bodyPr rtlCol="0" anchor="ctr"/>
-          <a:lstStyle/>
-          <a:p>
-            <a:pPr algn="ctr"/>
-            <a:r>
-              <a:rPr lang="de-DE" sz="800" dirty="0">
-                <a:solidFill>
-                  <a:schemeClr val="tx1"/>
-                </a:solidFill>
-              </a:rPr>
-              <a:t>Dem_1</a:t>
-            </a:r>
-          </a:p>
-        </p:txBody>
-      </p:sp>
-      <p:sp>
-        <p:nvSpPr>
-          <p:cNvPr id="13" name="Trapezoid 12">
-            <a:extLst>
-              <a:ext uri="{FF2B5EF4-FFF2-40B4-BE49-F238E27FC236}">
-                <a16:creationId xmlns:a16="http://schemas.microsoft.com/office/drawing/2014/main" id="{9B4F4C85-D8CC-D994-1551-CFD4749BE585}"/>
-              </a:ext>
-            </a:extLst>
-          </p:cNvPr>
-          <p:cNvSpPr/>
-          <p:nvPr/>
-        </p:nvSpPr>
-        <p:spPr>
-          <a:xfrm rot="10800000">
-            <a:off x="5053013" y="3159199"/>
-            <a:ext cx="561474" cy="208547"/>
-          </a:xfrm>
-          <a:prstGeom prst="trapezoid">
-            <a:avLst/>
-          </a:prstGeom>
-          <a:solidFill>
-            <a:srgbClr val="FFC000"/>
-          </a:solidFill>
-          <a:ln>
-            <a:solidFill>
-              <a:srgbClr val="FFC000"/>
-            </a:solidFill>
-          </a:ln>
-        </p:spPr>
-        <p:style>
-          <a:lnRef idx="2">
-            <a:schemeClr val="accent1">
-              <a:shade val="50000"/>
-            </a:schemeClr>
-          </a:lnRef>
-          <a:fillRef idx="1">
-            <a:schemeClr val="accent1"/>
-          </a:fillRef>
-          <a:effectRef idx="0">
-            <a:schemeClr val="accent1"/>
-          </a:effectRef>
-          <a:fontRef idx="minor">
-            <a:schemeClr val="lt1"/>
-          </a:fontRef>
-        </p:style>
-        <p:txBody>
-          <a:bodyPr rtlCol="0" anchor="ctr">
-            <a:scene3d>
-              <a:camera prst="orthographicFront">
-                <a:rot lat="0" lon="0" rev="10800000"/>
-              </a:camera>
-              <a:lightRig rig="threePt" dir="t"/>
-            </a:scene3d>
-          </a:bodyPr>
-          <a:lstStyle/>
-          <a:p>
-            <a:pPr algn="ctr"/>
-            <a:r>
-              <a:rPr lang="de-DE" sz="800" dirty="0">
-                <a:solidFill>
-                  <a:schemeClr val="tx1"/>
-                </a:solidFill>
-                <a:effectLst/>
-              </a:rPr>
-              <a:t>pv_1</a:t>
-            </a:r>
-          </a:p>
-        </p:txBody>
-      </p:sp>
-      <p:sp>
-        <p:nvSpPr>
-          <p:cNvPr id="14" name="Trapezoid 13">
-            <a:extLst>
-              <a:ext uri="{FF2B5EF4-FFF2-40B4-BE49-F238E27FC236}">
-                <a16:creationId xmlns:a16="http://schemas.microsoft.com/office/drawing/2014/main" id="{C5EFD546-C6CC-68D4-A51D-59ABF0988293}"/>
-              </a:ext>
-            </a:extLst>
-          </p:cNvPr>
-          <p:cNvSpPr/>
-          <p:nvPr/>
-        </p:nvSpPr>
-        <p:spPr>
-          <a:xfrm rot="10800000">
-            <a:off x="4683295" y="5060685"/>
-            <a:ext cx="561474" cy="208547"/>
-          </a:xfrm>
-          <a:prstGeom prst="trapezoid">
-            <a:avLst/>
-          </a:prstGeom>
-          <a:solidFill>
-            <a:srgbClr val="FFC000"/>
-          </a:solidFill>
-          <a:ln>
-            <a:solidFill>
-              <a:srgbClr val="FFC000"/>
-            </a:solidFill>
-          </a:ln>
-        </p:spPr>
-        <p:style>
-          <a:lnRef idx="2">
-            <a:schemeClr val="accent1">
-              <a:shade val="50000"/>
-            </a:schemeClr>
-          </a:lnRef>
-          <a:fillRef idx="1">
-            <a:schemeClr val="accent1"/>
-          </a:fillRef>
-          <a:effectRef idx="0">
-            <a:schemeClr val="accent1"/>
-          </a:effectRef>
-          <a:fontRef idx="minor">
-            <a:schemeClr val="lt1"/>
-          </a:fontRef>
-        </p:style>
-        <p:txBody>
-          <a:bodyPr rtlCol="0" anchor="ctr">
-            <a:scene3d>
-              <a:camera prst="orthographicFront">
-                <a:rot lat="0" lon="0" rev="10800000"/>
-              </a:camera>
-              <a:lightRig rig="threePt" dir="t"/>
-            </a:scene3d>
-          </a:bodyPr>
-          <a:lstStyle/>
-          <a:p>
-            <a:pPr algn="ctr"/>
-            <a:r>
-              <a:rPr lang="de-DE" sz="800" dirty="0">
-                <a:solidFill>
-                  <a:schemeClr val="tx1"/>
-                </a:solidFill>
-                <a:effectLst/>
-              </a:rPr>
-              <a:t>pv_2</a:t>
-            </a:r>
-          </a:p>
-        </p:txBody>
-      </p:sp>
-      <p:sp>
-        <p:nvSpPr>
-          <p:cNvPr id="15" name="Trapezoid 14">
-            <a:extLst>
-              <a:ext uri="{FF2B5EF4-FFF2-40B4-BE49-F238E27FC236}">
-                <a16:creationId xmlns:a16="http://schemas.microsoft.com/office/drawing/2014/main" id="{005D46DB-91B1-F3D5-0F2B-6874B239C7EA}"/>
-              </a:ext>
-            </a:extLst>
-          </p:cNvPr>
-          <p:cNvSpPr/>
-          <p:nvPr/>
-        </p:nvSpPr>
-        <p:spPr>
-          <a:xfrm rot="10800000">
-            <a:off x="7824208" y="5039629"/>
-            <a:ext cx="561474" cy="208547"/>
-          </a:xfrm>
-          <a:prstGeom prst="trapezoid">
-            <a:avLst/>
-          </a:prstGeom>
-          <a:solidFill>
-            <a:srgbClr val="FFC000"/>
-          </a:solidFill>
-          <a:ln>
-            <a:solidFill>
-              <a:srgbClr val="FFC000"/>
-            </a:solidFill>
-          </a:ln>
-        </p:spPr>
-        <p:style>
-          <a:lnRef idx="2">
-            <a:schemeClr val="accent1">
-              <a:shade val="50000"/>
-            </a:schemeClr>
-          </a:lnRef>
-          <a:fillRef idx="1">
-            <a:schemeClr val="accent1"/>
-          </a:fillRef>
-          <a:effectRef idx="0">
-            <a:schemeClr val="accent1"/>
-          </a:effectRef>
-          <a:fontRef idx="minor">
-            <a:schemeClr val="lt1"/>
-          </a:fontRef>
-        </p:style>
-        <p:txBody>
-          <a:bodyPr rtlCol="0" anchor="ctr">
-            <a:scene3d>
-              <a:camera prst="orthographicFront">
-                <a:rot lat="0" lon="0" rev="10800000"/>
-              </a:camera>
-              <a:lightRig rig="threePt" dir="t"/>
-            </a:scene3d>
-          </a:bodyPr>
-          <a:lstStyle/>
-          <a:p>
-            <a:pPr algn="ctr"/>
-            <a:r>
-              <a:rPr lang="de-DE" sz="800" dirty="0">
-                <a:solidFill>
-                  <a:schemeClr val="tx1"/>
-                </a:solidFill>
-                <a:effectLst/>
-              </a:rPr>
-              <a:t>pv_3</a:t>
-            </a:r>
-          </a:p>
-        </p:txBody>
-      </p:sp>
-      <p:sp>
-        <p:nvSpPr>
-          <p:cNvPr id="18" name="Trapezoid 17">
-            <a:extLst>
-              <a:ext uri="{FF2B5EF4-FFF2-40B4-BE49-F238E27FC236}">
-                <a16:creationId xmlns:a16="http://schemas.microsoft.com/office/drawing/2014/main" id="{E994B2B2-8C56-8BC8-FC1D-D8599403BCCD}"/>
-              </a:ext>
-            </a:extLst>
-          </p:cNvPr>
-          <p:cNvSpPr/>
-          <p:nvPr/>
-        </p:nvSpPr>
-        <p:spPr>
-          <a:xfrm rot="10800000">
-            <a:off x="5817398" y="1143530"/>
-            <a:ext cx="1044992" cy="428626"/>
-          </a:xfrm>
-          <a:prstGeom prst="trapezoid">
-            <a:avLst/>
-          </a:prstGeom>
-          <a:solidFill>
-            <a:srgbClr val="FFC000"/>
-          </a:solidFill>
-          <a:ln>
-            <a:solidFill>
-              <a:srgbClr val="FFC000"/>
-            </a:solidFill>
-          </a:ln>
-        </p:spPr>
-        <p:style>
-          <a:lnRef idx="2">
-            <a:schemeClr val="accent1">
-              <a:shade val="50000"/>
-            </a:schemeClr>
-          </a:lnRef>
-          <a:fillRef idx="1">
-            <a:schemeClr val="accent1"/>
-          </a:fillRef>
-          <a:effectRef idx="0">
-            <a:schemeClr val="accent1"/>
-          </a:effectRef>
-          <a:fontRef idx="minor">
-            <a:schemeClr val="lt1"/>
-          </a:fontRef>
-        </p:style>
-        <p:txBody>
-          <a:bodyPr rtlCol="0" anchor="ctr">
-            <a:scene3d>
-              <a:camera prst="orthographicFront">
-                <a:rot lat="0" lon="0" rev="10800000"/>
-              </a:camera>
-              <a:lightRig rig="threePt" dir="t"/>
-            </a:scene3d>
-          </a:bodyPr>
-          <a:lstStyle/>
-          <a:p>
-            <a:pPr algn="ctr"/>
-            <a:r>
-              <a:rPr lang="de-DE" sz="800" dirty="0" err="1">
-                <a:solidFill>
-                  <a:schemeClr val="tx1"/>
-                </a:solidFill>
-                <a:effectLst/>
-              </a:rPr>
-              <a:t>Source_es</a:t>
-            </a:r>
-            <a:endParaRPr lang="de-DE" sz="800" dirty="0">
-              <a:solidFill>
-                <a:schemeClr val="tx1"/>
-              </a:solidFill>
-              <a:effectLst/>
-            </a:endParaRPr>
-          </a:p>
-        </p:txBody>
-      </p:sp>
-      <p:cxnSp>
-        <p:nvCxnSpPr>
-          <p:cNvPr id="20" name="Verbinder: gewinkelt 19">
-            <a:extLst>
-              <a:ext uri="{FF2B5EF4-FFF2-40B4-BE49-F238E27FC236}">
-                <a16:creationId xmlns:a16="http://schemas.microsoft.com/office/drawing/2014/main" id="{7B43937E-509C-2BFC-C56C-74C6E22BBDD8}"/>
-              </a:ext>
-            </a:extLst>
-          </p:cNvPr>
-          <p:cNvCxnSpPr>
-            <a:cxnSpLocks/>
-            <a:stCxn id="18" idx="0"/>
-            <a:endCxn id="32" idx="1"/>
-          </p:cNvCxnSpPr>
-          <p:nvPr/>
-        </p:nvCxnSpPr>
-        <p:spPr>
-          <a:xfrm rot="16200000" flipH="1">
-            <a:off x="6758033" y="1154016"/>
-            <a:ext cx="742826" cy="1579105"/>
-          </a:xfrm>
-          <a:prstGeom prst="bentConnector2">
-            <a:avLst/>
-          </a:prstGeom>
-          <a:ln w="19050">
-            <a:solidFill>
-              <a:srgbClr val="FFC000"/>
-            </a:solidFill>
-          </a:ln>
-        </p:spPr>
-        <p:style>
-          <a:lnRef idx="1">
-            <a:schemeClr val="accent1"/>
-          </a:lnRef>
-          <a:fillRef idx="0">
-            <a:schemeClr val="accent1"/>
-          </a:fillRef>
-          <a:effectRef idx="0">
-            <a:schemeClr val="accent1"/>
-          </a:effectRef>
-          <a:fontRef idx="minor">
-            <a:schemeClr val="tx1"/>
-          </a:fontRef>
-        </p:style>
-      </p:cxnSp>
-      <p:cxnSp>
-        <p:nvCxnSpPr>
-          <p:cNvPr id="21" name="Verbinder: gewinkelt 20">
-            <a:extLst>
-              <a:ext uri="{FF2B5EF4-FFF2-40B4-BE49-F238E27FC236}">
-                <a16:creationId xmlns:a16="http://schemas.microsoft.com/office/drawing/2014/main" id="{E9DFEF35-19CF-ADCE-22C7-12CEF5B1FB28}"/>
-              </a:ext>
-            </a:extLst>
-          </p:cNvPr>
-          <p:cNvCxnSpPr>
-            <a:cxnSpLocks/>
-            <a:stCxn id="13" idx="0"/>
-            <a:endCxn id="10" idx="0"/>
-          </p:cNvCxnSpPr>
-          <p:nvPr/>
-        </p:nvCxnSpPr>
-        <p:spPr>
-          <a:xfrm rot="16200000" flipH="1">
-            <a:off x="5202093" y="3499403"/>
-            <a:ext cx="632660" cy="369346"/>
-          </a:xfrm>
-          <a:prstGeom prst="bentConnector3">
-            <a:avLst>
-              <a:gd name="adj1" fmla="val 78605"/>
-            </a:avLst>
-          </a:prstGeom>
-          <a:ln w="19050">
-            <a:solidFill>
-              <a:srgbClr val="FFC000"/>
-            </a:solidFill>
-          </a:ln>
-        </p:spPr>
-        <p:style>
-          <a:lnRef idx="1">
-            <a:schemeClr val="accent1"/>
-          </a:lnRef>
-          <a:fillRef idx="0">
-            <a:schemeClr val="accent1"/>
-          </a:fillRef>
-          <a:effectRef idx="0">
-            <a:schemeClr val="accent1"/>
-          </a:effectRef>
-          <a:fontRef idx="minor">
-            <a:schemeClr val="tx1"/>
-          </a:fontRef>
-        </p:style>
-      </p:cxnSp>
-      <p:cxnSp>
-        <p:nvCxnSpPr>
-          <p:cNvPr id="24" name="Verbinder: gewinkelt 23">
-            <a:extLst>
-              <a:ext uri="{FF2B5EF4-FFF2-40B4-BE49-F238E27FC236}">
-                <a16:creationId xmlns:a16="http://schemas.microsoft.com/office/drawing/2014/main" id="{B621AFC8-EA10-82D1-725F-AE9991F368F7}"/>
-              </a:ext>
-            </a:extLst>
-          </p:cNvPr>
-          <p:cNvCxnSpPr>
-            <a:cxnSpLocks/>
-            <a:stCxn id="14" idx="0"/>
-            <a:endCxn id="12" idx="0"/>
-          </p:cNvCxnSpPr>
-          <p:nvPr/>
-        </p:nvCxnSpPr>
-        <p:spPr>
-          <a:xfrm rot="16200000" flipH="1">
-            <a:off x="5210303" y="5022960"/>
-            <a:ext cx="424112" cy="916655"/>
-          </a:xfrm>
-          <a:prstGeom prst="bentConnector3">
-            <a:avLst>
-              <a:gd name="adj1" fmla="val 50000"/>
-            </a:avLst>
-          </a:prstGeom>
-          <a:ln w="19050">
-            <a:solidFill>
-              <a:srgbClr val="FFC000"/>
-            </a:solidFill>
-          </a:ln>
-        </p:spPr>
-        <p:style>
-          <a:lnRef idx="1">
-            <a:schemeClr val="accent1"/>
-          </a:lnRef>
-          <a:fillRef idx="0">
-            <a:schemeClr val="accent1"/>
-          </a:fillRef>
-          <a:effectRef idx="0">
-            <a:schemeClr val="accent1"/>
-          </a:effectRef>
-          <a:fontRef idx="minor">
-            <a:schemeClr val="tx1"/>
-          </a:fontRef>
-        </p:style>
-      </p:cxnSp>
-      <p:cxnSp>
-        <p:nvCxnSpPr>
-          <p:cNvPr id="28" name="Verbinder: gewinkelt 27">
-            <a:extLst>
-              <a:ext uri="{FF2B5EF4-FFF2-40B4-BE49-F238E27FC236}">
-                <a16:creationId xmlns:a16="http://schemas.microsoft.com/office/drawing/2014/main" id="{C20537DC-5508-38D6-8610-C5C2923CB38F}"/>
-              </a:ext>
-            </a:extLst>
-          </p:cNvPr>
-          <p:cNvCxnSpPr>
-            <a:cxnSpLocks/>
-            <a:stCxn id="15" idx="0"/>
-            <a:endCxn id="11" idx="0"/>
-          </p:cNvCxnSpPr>
-          <p:nvPr/>
-        </p:nvCxnSpPr>
-        <p:spPr>
-          <a:xfrm rot="16200000" flipH="1">
-            <a:off x="8349398" y="5003723"/>
-            <a:ext cx="426621" cy="915526"/>
-          </a:xfrm>
-          <a:prstGeom prst="bentConnector3">
-            <a:avLst>
-              <a:gd name="adj1" fmla="val 50000"/>
-            </a:avLst>
-          </a:prstGeom>
-          <a:ln w="19050">
-            <a:solidFill>
-              <a:srgbClr val="FFC000"/>
-            </a:solidFill>
-          </a:ln>
-        </p:spPr>
-        <p:style>
-          <a:lnRef idx="1">
-            <a:schemeClr val="accent1"/>
-          </a:lnRef>
-          <a:fillRef idx="0">
-            <a:schemeClr val="accent1"/>
-          </a:fillRef>
-          <a:effectRef idx="0">
-            <a:schemeClr val="accent1"/>
-          </a:effectRef>
-          <a:fontRef idx="minor">
-            <a:schemeClr val="tx1"/>
-          </a:fontRef>
-        </p:style>
-      </p:cxnSp>
+              <a:t> Connection Design</a:t>
+            </a:r>
+          </a:p>
+        </p:txBody>
+      </p:sp>
       <p:grpSp>
         <p:nvGrpSpPr>
-          <p:cNvPr id="34" name="Gruppieren 33">
-            <a:extLst>
-              <a:ext uri="{FF2B5EF4-FFF2-40B4-BE49-F238E27FC236}">
-                <a16:creationId xmlns:a16="http://schemas.microsoft.com/office/drawing/2014/main" id="{5517493E-E0CC-0CF6-D876-5D7E971DE285}"/>
+          <p:cNvPr id="26" name="Gruppieren 25">
+            <a:extLst>
+              <a:ext uri="{FF2B5EF4-FFF2-40B4-BE49-F238E27FC236}">
+                <a16:creationId xmlns:a16="http://schemas.microsoft.com/office/drawing/2014/main" id="{374A8D08-81D9-8C1E-CA09-1CCC68A1C54E}"/>
               </a:ext>
             </a:extLst>
           </p:cNvPr>
@@ -4187,18 +3373,18 @@
         </p:nvGrpSpPr>
         <p:grpSpPr>
           <a:xfrm>
-            <a:off x="7918999" y="2005420"/>
-            <a:ext cx="725656" cy="619124"/>
-            <a:chOff x="4514222" y="2662237"/>
-            <a:chExt cx="725656" cy="619124"/>
+            <a:off x="6076950" y="435976"/>
+            <a:ext cx="5990222" cy="2797843"/>
+            <a:chOff x="166437" y="3064543"/>
+            <a:chExt cx="8005010" cy="3505200"/>
           </a:xfrm>
         </p:grpSpPr>
         <p:sp>
           <p:nvSpPr>
-            <p:cNvPr id="32" name="Raute 31">
+            <p:cNvPr id="27" name="Ellipse 26">
               <a:extLst>
                 <a:ext uri="{FF2B5EF4-FFF2-40B4-BE49-F238E27FC236}">
-                  <a16:creationId xmlns:a16="http://schemas.microsoft.com/office/drawing/2014/main" id="{8280EEDF-B9CE-D8AB-1F6F-25704F6E2981}"/>
+                  <a16:creationId xmlns:a16="http://schemas.microsoft.com/office/drawing/2014/main" id="{56019DC2-3E8D-5F87-E7A7-0F46B1C0A8FA}"/>
                 </a:ext>
               </a:extLst>
             </p:cNvPr>
@@ -4207,18 +3393,16 @@
           </p:nvSpPr>
           <p:spPr>
             <a:xfrm>
-              <a:off x="4514222" y="2662237"/>
-              <a:ext cx="725656" cy="619124"/>
+              <a:off x="166437" y="3064543"/>
+              <a:ext cx="8005010" cy="3505200"/>
             </a:xfrm>
-            <a:prstGeom prst="diamond">
+            <a:prstGeom prst="ellipse">
               <a:avLst/>
             </a:prstGeom>
-            <a:solidFill>
-              <a:srgbClr val="FFC000"/>
-            </a:solidFill>
+            <a:noFill/>
             <a:ln>
               <a:solidFill>
-                <a:srgbClr val="FFC000"/>
+                <a:schemeClr val="tx1"/>
               </a:solidFill>
             </a:ln>
           </p:spPr>
@@ -4243,72 +3427,16 @@
             <a:lstStyle/>
             <a:p>
               <a:pPr algn="ctr"/>
-              <a:endParaRPr lang="de-DE" sz="800" dirty="0"/>
+              <a:endParaRPr lang="de-DE"/>
             </a:p>
           </p:txBody>
         </p:sp>
         <p:sp>
           <p:nvSpPr>
-            <p:cNvPr id="33" name="Textfeld 32">
+            <p:cNvPr id="28" name="Trapezoid 27">
               <a:extLst>
                 <a:ext uri="{FF2B5EF4-FFF2-40B4-BE49-F238E27FC236}">
-                  <a16:creationId xmlns:a16="http://schemas.microsoft.com/office/drawing/2014/main" id="{3F9D0A7B-EBF1-4BD4-5B25-16B396780F1D}"/>
-                </a:ext>
-              </a:extLst>
-            </p:cNvPr>
-            <p:cNvSpPr txBox="1"/>
-            <p:nvPr/>
-          </p:nvSpPr>
-          <p:spPr>
-            <a:xfrm>
-              <a:off x="4600659" y="2856621"/>
-              <a:ext cx="611065" cy="215444"/>
-            </a:xfrm>
-            <a:prstGeom prst="rect">
-              <a:avLst/>
-            </a:prstGeom>
-            <a:noFill/>
-          </p:spPr>
-          <p:txBody>
-            <a:bodyPr wrap="none" rtlCol="0">
-              <a:spAutoFit/>
-            </a:bodyPr>
-            <a:lstStyle/>
-            <a:p>
-              <a:r>
-                <a:rPr lang="de-DE" sz="800" dirty="0"/>
-                <a:t>cc_es_ec1</a:t>
-              </a:r>
-            </a:p>
-          </p:txBody>
-        </p:sp>
-      </p:grpSp>
-      <p:grpSp>
-        <p:nvGrpSpPr>
-          <p:cNvPr id="35" name="Gruppieren 34">
-            <a:extLst>
-              <a:ext uri="{FF2B5EF4-FFF2-40B4-BE49-F238E27FC236}">
-                <a16:creationId xmlns:a16="http://schemas.microsoft.com/office/drawing/2014/main" id="{E78EAB38-B608-7610-742D-6BB977CD9B22}"/>
-              </a:ext>
-            </a:extLst>
-          </p:cNvPr>
-          <p:cNvGrpSpPr/>
-          <p:nvPr/>
-        </p:nvGrpSpPr>
-        <p:grpSpPr>
-          <a:xfrm>
-            <a:off x="6281890" y="4786715"/>
-            <a:ext cx="725656" cy="619124"/>
-            <a:chOff x="4514222" y="2662237"/>
-            <a:chExt cx="725656" cy="619124"/>
-          </a:xfrm>
-        </p:grpSpPr>
-        <p:sp>
-          <p:nvSpPr>
-            <p:cNvPr id="36" name="Raute 35">
-              <a:extLst>
-                <a:ext uri="{FF2B5EF4-FFF2-40B4-BE49-F238E27FC236}">
-                  <a16:creationId xmlns:a16="http://schemas.microsoft.com/office/drawing/2014/main" id="{9837D4A4-F0AC-0C2E-96ED-91404D0F65F3}"/>
+                  <a16:creationId xmlns:a16="http://schemas.microsoft.com/office/drawing/2014/main" id="{6A6C7FA3-52C8-4C87-7D29-5285AB54AD0F}"/>
                 </a:ext>
               </a:extLst>
             </p:cNvPr>
@@ -4317,20 +3445,12 @@
           </p:nvSpPr>
           <p:spPr>
             <a:xfrm>
-              <a:off x="4514222" y="2662237"/>
-              <a:ext cx="725656" cy="619124"/>
+              <a:off x="1257300" y="5521492"/>
+              <a:ext cx="1114926" cy="449179"/>
             </a:xfrm>
-            <a:prstGeom prst="diamond">
+            <a:prstGeom prst="trapezoid">
               <a:avLst/>
             </a:prstGeom>
-            <a:solidFill>
-              <a:srgbClr val="FFC000"/>
-            </a:solidFill>
-            <a:ln>
-              <a:solidFill>
-                <a:srgbClr val="FFC000"/>
-              </a:solidFill>
-            </a:ln>
           </p:spPr>
           <p:style>
             <a:lnRef idx="2">
@@ -4353,72 +3473,19 @@
             <a:lstStyle/>
             <a:p>
               <a:pPr algn="ctr"/>
-              <a:endParaRPr lang="de-DE" sz="800" dirty="0"/>
+              <a:r>
+                <a:rPr lang="de-DE" sz="1200" dirty="0"/>
+                <a:t>sink</a:t>
+              </a:r>
             </a:p>
           </p:txBody>
         </p:sp>
         <p:sp>
           <p:nvSpPr>
-            <p:cNvPr id="37" name="Textfeld 36">
+            <p:cNvPr id="29" name="Trapezoid 28">
               <a:extLst>
                 <a:ext uri="{FF2B5EF4-FFF2-40B4-BE49-F238E27FC236}">
-                  <a16:creationId xmlns:a16="http://schemas.microsoft.com/office/drawing/2014/main" id="{BA698471-41A8-27A4-24C2-7850CB1EACEE}"/>
-                </a:ext>
-              </a:extLst>
-            </p:cNvPr>
-            <p:cNvSpPr txBox="1"/>
-            <p:nvPr/>
-          </p:nvSpPr>
-          <p:spPr>
-            <a:xfrm>
-              <a:off x="4557119" y="2855872"/>
-              <a:ext cx="665567" cy="215444"/>
-            </a:xfrm>
-            <a:prstGeom prst="rect">
-              <a:avLst/>
-            </a:prstGeom>
-            <a:noFill/>
-          </p:spPr>
-          <p:txBody>
-            <a:bodyPr wrap="none" rtlCol="0">
-              <a:spAutoFit/>
-            </a:bodyPr>
-            <a:lstStyle/>
-            <a:p>
-              <a:r>
-                <a:rPr lang="de-DE" sz="800" dirty="0"/>
-                <a:t>cc_ec2_ec1</a:t>
-              </a:r>
-            </a:p>
-          </p:txBody>
-        </p:sp>
-      </p:grpSp>
-      <p:grpSp>
-        <p:nvGrpSpPr>
-          <p:cNvPr id="38" name="Gruppieren 37">
-            <a:extLst>
-              <a:ext uri="{FF2B5EF4-FFF2-40B4-BE49-F238E27FC236}">
-                <a16:creationId xmlns:a16="http://schemas.microsoft.com/office/drawing/2014/main" id="{EF41EB6C-CF19-7B90-C933-DE1FF5258E1C}"/>
-              </a:ext>
-            </a:extLst>
-          </p:cNvPr>
-          <p:cNvGrpSpPr/>
-          <p:nvPr/>
-        </p:nvGrpSpPr>
-        <p:grpSpPr>
-          <a:xfrm>
-            <a:off x="9439446" y="4960925"/>
-            <a:ext cx="725656" cy="619124"/>
-            <a:chOff x="4514222" y="2662237"/>
-            <a:chExt cx="725656" cy="619124"/>
-          </a:xfrm>
-        </p:grpSpPr>
-        <p:sp>
-          <p:nvSpPr>
-            <p:cNvPr id="39" name="Raute 38">
-              <a:extLst>
-                <a:ext uri="{FF2B5EF4-FFF2-40B4-BE49-F238E27FC236}">
-                  <a16:creationId xmlns:a16="http://schemas.microsoft.com/office/drawing/2014/main" id="{75564834-4E56-B27E-8C8D-C022C87AACC8}"/>
+                  <a16:creationId xmlns:a16="http://schemas.microsoft.com/office/drawing/2014/main" id="{461F6781-A36F-264B-7BA6-985477DDE8A0}"/>
                 </a:ext>
               </a:extLst>
             </p:cNvPr>
@@ -4427,20 +3494,70 @@
           </p:nvSpPr>
           <p:spPr>
             <a:xfrm>
-              <a:off x="4514222" y="2662237"/>
-              <a:ext cx="725656" cy="619124"/>
+              <a:off x="1257300" y="3835066"/>
+              <a:ext cx="1114926" cy="449179"/>
             </a:xfrm>
-            <a:prstGeom prst="diamond">
+            <a:prstGeom prst="trapezoid">
               <a:avLst/>
             </a:prstGeom>
-            <a:solidFill>
-              <a:srgbClr val="FFC000"/>
-            </a:solidFill>
-            <a:ln>
-              <a:solidFill>
-                <a:srgbClr val="FFC000"/>
-              </a:solidFill>
-            </a:ln>
+            <a:scene3d>
+              <a:camera prst="orthographicFront">
+                <a:rot lat="0" lon="0" rev="10800000"/>
+              </a:camera>
+              <a:lightRig rig="threePt" dir="t"/>
+            </a:scene3d>
+            <a:sp3d/>
+          </p:spPr>
+          <p:style>
+            <a:lnRef idx="2">
+              <a:schemeClr val="accent1">
+                <a:shade val="50000"/>
+              </a:schemeClr>
+            </a:lnRef>
+            <a:fillRef idx="1">
+              <a:schemeClr val="accent1"/>
+            </a:fillRef>
+            <a:effectRef idx="0">
+              <a:schemeClr val="accent1"/>
+            </a:effectRef>
+            <a:fontRef idx="minor">
+              <a:schemeClr val="lt1"/>
+            </a:fontRef>
+          </p:style>
+          <p:txBody>
+            <a:bodyPr rtlCol="0" anchor="ctr">
+              <a:flatTx/>
+            </a:bodyPr>
+            <a:lstStyle/>
+            <a:p>
+              <a:pPr algn="ctr"/>
+              <a:r>
+                <a:rPr lang="de-DE" sz="1200" dirty="0"/>
+                <a:t>source</a:t>
+              </a:r>
+            </a:p>
+          </p:txBody>
+        </p:sp>
+        <p:sp>
+          <p:nvSpPr>
+            <p:cNvPr id="30" name="Ellipse 29">
+              <a:extLst>
+                <a:ext uri="{FF2B5EF4-FFF2-40B4-BE49-F238E27FC236}">
+                  <a16:creationId xmlns:a16="http://schemas.microsoft.com/office/drawing/2014/main" id="{F3FC7819-7A53-63AA-444C-999BDD2461A2}"/>
+                </a:ext>
+              </a:extLst>
+            </p:cNvPr>
+            <p:cNvSpPr/>
+            <p:nvPr/>
+          </p:nvSpPr>
+          <p:spPr>
+            <a:xfrm>
+              <a:off x="3057525" y="4657725"/>
+              <a:ext cx="1666875" cy="485775"/>
+            </a:xfrm>
+            <a:prstGeom prst="ellipse">
+              <a:avLst/>
+            </a:prstGeom>
           </p:spPr>
           <p:style>
             <a:lnRef idx="2">
@@ -4463,515 +3580,131 @@
             <a:lstStyle/>
             <a:p>
               <a:pPr algn="ctr"/>
-              <a:endParaRPr lang="de-DE" sz="800" dirty="0"/>
+              <a:r>
+                <a:rPr lang="de-DE" sz="1200" dirty="0" err="1"/>
+                <a:t>bus</a:t>
+              </a:r>
+              <a:endParaRPr lang="de-DE" sz="1200" dirty="0"/>
             </a:p>
           </p:txBody>
         </p:sp>
-        <p:sp>
-          <p:nvSpPr>
-            <p:cNvPr id="40" name="Textfeld 39">
+        <p:cxnSp>
+          <p:nvCxnSpPr>
+            <p:cNvPr id="31" name="Verbinder: gewinkelt 30">
               <a:extLst>
                 <a:ext uri="{FF2B5EF4-FFF2-40B4-BE49-F238E27FC236}">
-                  <a16:creationId xmlns:a16="http://schemas.microsoft.com/office/drawing/2014/main" id="{AFF87BE9-A33B-9E2F-78E8-E66721AF0410}"/>
+                  <a16:creationId xmlns:a16="http://schemas.microsoft.com/office/drawing/2014/main" id="{623448B7-68A2-F90C-9A65-617D1C0ACA77}"/>
                 </a:ext>
               </a:extLst>
             </p:cNvPr>
-            <p:cNvSpPr txBox="1"/>
+            <p:cNvCxnSpPr>
+              <a:cxnSpLocks/>
+              <a:stCxn id="29" idx="2"/>
+              <a:endCxn id="30" idx="1"/>
+            </p:cNvCxnSpPr>
             <p:nvPr/>
-          </p:nvSpPr>
+          </p:nvCxnSpPr>
           <p:spPr>
-            <a:xfrm>
-              <a:off x="4574311" y="2857749"/>
-              <a:ext cx="665567" cy="215444"/>
+            <a:xfrm rot="16200000" flipH="1">
+              <a:off x="2335888" y="3763120"/>
+              <a:ext cx="444620" cy="1486870"/>
             </a:xfrm>
-            <a:prstGeom prst="rect">
+            <a:prstGeom prst="bentConnector3">
               <a:avLst/>
             </a:prstGeom>
-            <a:noFill/>
-          </p:spPr>
-          <p:txBody>
-            <a:bodyPr wrap="none" rtlCol="0">
-              <a:spAutoFit/>
-            </a:bodyPr>
-            <a:lstStyle/>
-            <a:p>
-              <a:r>
-                <a:rPr lang="de-DE" sz="800" dirty="0"/>
-                <a:t>cc_ec3_ec1</a:t>
-              </a:r>
-            </a:p>
-          </p:txBody>
-        </p:sp>
-      </p:grpSp>
-      <p:grpSp>
-        <p:nvGrpSpPr>
-          <p:cNvPr id="48" name="Gruppieren 47">
-            <a:extLst>
-              <a:ext uri="{FF2B5EF4-FFF2-40B4-BE49-F238E27FC236}">
-                <a16:creationId xmlns:a16="http://schemas.microsoft.com/office/drawing/2014/main" id="{98D2E7FA-1C07-B9DC-FC3A-5C29BB0264F8}"/>
-              </a:ext>
-            </a:extLst>
-          </p:cNvPr>
-          <p:cNvGrpSpPr/>
-          <p:nvPr/>
-        </p:nvGrpSpPr>
-        <p:grpSpPr>
-          <a:xfrm>
-            <a:off x="6285249" y="3765222"/>
-            <a:ext cx="752004" cy="619124"/>
-            <a:chOff x="4514222" y="2662237"/>
-            <a:chExt cx="752004" cy="619124"/>
-          </a:xfrm>
-        </p:grpSpPr>
-        <p:sp>
-          <p:nvSpPr>
-            <p:cNvPr id="49" name="Raute 48">
-              <a:extLst>
-                <a:ext uri="{FF2B5EF4-FFF2-40B4-BE49-F238E27FC236}">
-                  <a16:creationId xmlns:a16="http://schemas.microsoft.com/office/drawing/2014/main" id="{06CAFB8E-4887-77B8-A5D5-8C418D596DB5}"/>
-                </a:ext>
-              </a:extLst>
-            </p:cNvPr>
-            <p:cNvSpPr/>
-            <p:nvPr/>
-          </p:nvSpPr>
-          <p:spPr>
-            <a:xfrm>
-              <a:off x="4514222" y="2662237"/>
-              <a:ext cx="725656" cy="619124"/>
-            </a:xfrm>
-            <a:prstGeom prst="diamond">
-              <a:avLst/>
-            </a:prstGeom>
-            <a:solidFill>
-              <a:srgbClr val="FFC000"/>
-            </a:solidFill>
-            <a:ln>
-              <a:solidFill>
-                <a:srgbClr val="FFC000"/>
-              </a:solidFill>
+            <a:ln w="28575">
+              <a:tailEnd type="triangle"/>
             </a:ln>
           </p:spPr>
           <p:style>
-            <a:lnRef idx="2">
-              <a:schemeClr val="accent1">
-                <a:shade val="50000"/>
-              </a:schemeClr>
+            <a:lnRef idx="1">
+              <a:schemeClr val="accent1"/>
             </a:lnRef>
-            <a:fillRef idx="1">
+            <a:fillRef idx="0">
               <a:schemeClr val="accent1"/>
             </a:fillRef>
             <a:effectRef idx="0">
               <a:schemeClr val="accent1"/>
             </a:effectRef>
             <a:fontRef idx="minor">
-              <a:schemeClr val="lt1"/>
+              <a:schemeClr val="tx1"/>
             </a:fontRef>
           </p:style>
-          <p:txBody>
-            <a:bodyPr rtlCol="0" anchor="ctr"/>
-            <a:lstStyle/>
-            <a:p>
-              <a:pPr algn="ctr"/>
-              <a:endParaRPr lang="de-DE" sz="800" dirty="0"/>
-            </a:p>
-          </p:txBody>
-        </p:sp>
-        <p:sp>
-          <p:nvSpPr>
-            <p:cNvPr id="50" name="Textfeld 49">
+        </p:cxnSp>
+        <p:cxnSp>
+          <p:nvCxnSpPr>
+            <p:cNvPr id="32" name="Verbinder: gewinkelt 31">
               <a:extLst>
                 <a:ext uri="{FF2B5EF4-FFF2-40B4-BE49-F238E27FC236}">
-                  <a16:creationId xmlns:a16="http://schemas.microsoft.com/office/drawing/2014/main" id="{CE4042F3-8BAB-E2BC-5F28-3DD60263D74D}"/>
+                  <a16:creationId xmlns:a16="http://schemas.microsoft.com/office/drawing/2014/main" id="{C37EE4ED-487E-6E67-F39C-FB565DEB2076}"/>
                 </a:ext>
               </a:extLst>
             </p:cNvPr>
-            <p:cNvSpPr txBox="1"/>
+            <p:cNvCxnSpPr>
+              <a:cxnSpLocks/>
+              <a:stCxn id="30" idx="3"/>
+              <a:endCxn id="28" idx="0"/>
+            </p:cNvCxnSpPr>
             <p:nvPr/>
-          </p:nvSpPr>
+          </p:nvCxnSpPr>
           <p:spPr>
-            <a:xfrm>
-              <a:off x="4600659" y="2856621"/>
-              <a:ext cx="665567" cy="215444"/>
+            <a:xfrm rot="5400000">
+              <a:off x="2333632" y="4553491"/>
+              <a:ext cx="449132" cy="1486870"/>
             </a:xfrm>
-            <a:prstGeom prst="rect">
-              <a:avLst/>
+            <a:prstGeom prst="bentConnector3">
+              <a:avLst>
+                <a:gd name="adj1" fmla="val 50000"/>
+              </a:avLst>
             </a:prstGeom>
-            <a:noFill/>
-          </p:spPr>
-          <p:txBody>
-            <a:bodyPr wrap="none" rtlCol="0">
-              <a:spAutoFit/>
-            </a:bodyPr>
-            <a:lstStyle/>
-            <a:p>
-              <a:r>
-                <a:rPr lang="de-DE" sz="800" dirty="0"/>
-                <a:t>cc_ec1_ec2</a:t>
-              </a:r>
-            </a:p>
-          </p:txBody>
-        </p:sp>
-      </p:grpSp>
-      <p:grpSp>
-        <p:nvGrpSpPr>
-          <p:cNvPr id="51" name="Gruppieren 50">
-            <a:extLst>
-              <a:ext uri="{FF2B5EF4-FFF2-40B4-BE49-F238E27FC236}">
-                <a16:creationId xmlns:a16="http://schemas.microsoft.com/office/drawing/2014/main" id="{A040A00C-C6B6-95C3-D56A-C64435FBB463}"/>
-              </a:ext>
-            </a:extLst>
-          </p:cNvPr>
-          <p:cNvGrpSpPr/>
-          <p:nvPr/>
-        </p:nvGrpSpPr>
-        <p:grpSpPr>
-          <a:xfrm>
-            <a:off x="9426272" y="3399265"/>
-            <a:ext cx="752004" cy="619124"/>
-            <a:chOff x="4514222" y="2662237"/>
-            <a:chExt cx="752004" cy="619124"/>
-          </a:xfrm>
-        </p:grpSpPr>
-        <p:sp>
-          <p:nvSpPr>
-            <p:cNvPr id="52" name="Raute 51">
-              <a:extLst>
-                <a:ext uri="{FF2B5EF4-FFF2-40B4-BE49-F238E27FC236}">
-                  <a16:creationId xmlns:a16="http://schemas.microsoft.com/office/drawing/2014/main" id="{E3B6936C-10C2-974A-D67C-4BE64D04F0CD}"/>
-                </a:ext>
-              </a:extLst>
-            </p:cNvPr>
-            <p:cNvSpPr/>
-            <p:nvPr/>
-          </p:nvSpPr>
-          <p:spPr>
-            <a:xfrm>
-              <a:off x="4514222" y="2662237"/>
-              <a:ext cx="725656" cy="619124"/>
-            </a:xfrm>
-            <a:prstGeom prst="diamond">
-              <a:avLst/>
-            </a:prstGeom>
-            <a:solidFill>
-              <a:srgbClr val="FFC000"/>
-            </a:solidFill>
-            <a:ln>
-              <a:solidFill>
-                <a:srgbClr val="FFC000"/>
-              </a:solidFill>
+            <a:ln w="28575">
+              <a:tailEnd type="triangle"/>
             </a:ln>
           </p:spPr>
           <p:style>
-            <a:lnRef idx="2">
-              <a:schemeClr val="accent1">
-                <a:shade val="50000"/>
-              </a:schemeClr>
+            <a:lnRef idx="1">
+              <a:schemeClr val="accent1"/>
             </a:lnRef>
-            <a:fillRef idx="1">
+            <a:fillRef idx="0">
               <a:schemeClr val="accent1"/>
             </a:fillRef>
             <a:effectRef idx="0">
               <a:schemeClr val="accent1"/>
             </a:effectRef>
             <a:fontRef idx="minor">
-              <a:schemeClr val="lt1"/>
+              <a:schemeClr val="tx1"/>
             </a:fontRef>
           </p:style>
-          <p:txBody>
-            <a:bodyPr rtlCol="0" anchor="ctr"/>
-            <a:lstStyle/>
-            <a:p>
-              <a:pPr algn="ctr"/>
-              <a:endParaRPr lang="de-DE" sz="800" dirty="0"/>
-            </a:p>
-          </p:txBody>
-        </p:sp>
-        <p:sp>
-          <p:nvSpPr>
-            <p:cNvPr id="53" name="Textfeld 52">
-              <a:extLst>
-                <a:ext uri="{FF2B5EF4-FFF2-40B4-BE49-F238E27FC236}">
-                  <a16:creationId xmlns:a16="http://schemas.microsoft.com/office/drawing/2014/main" id="{AE6BAE95-8D6F-05C8-D58F-A7F1095C077E}"/>
-                </a:ext>
-              </a:extLst>
-            </p:cNvPr>
-            <p:cNvSpPr txBox="1"/>
-            <p:nvPr/>
-          </p:nvSpPr>
-          <p:spPr>
-            <a:xfrm>
-              <a:off x="4600659" y="2856621"/>
-              <a:ext cx="665567" cy="215444"/>
-            </a:xfrm>
-            <a:prstGeom prst="rect">
-              <a:avLst/>
-            </a:prstGeom>
-            <a:noFill/>
-          </p:spPr>
-          <p:txBody>
-            <a:bodyPr wrap="none" rtlCol="0">
-              <a:spAutoFit/>
-            </a:bodyPr>
-            <a:lstStyle/>
-            <a:p>
-              <a:r>
-                <a:rPr lang="de-DE" sz="800" dirty="0"/>
-                <a:t>cc_ec1_ec3</a:t>
-              </a:r>
-            </a:p>
-          </p:txBody>
-        </p:sp>
-      </p:grpSp>
-      <p:grpSp>
-        <p:nvGrpSpPr>
-          <p:cNvPr id="54" name="Gruppieren 53">
-            <a:extLst>
-              <a:ext uri="{FF2B5EF4-FFF2-40B4-BE49-F238E27FC236}">
-                <a16:creationId xmlns:a16="http://schemas.microsoft.com/office/drawing/2014/main" id="{B64018CA-E61A-207D-252C-7D2EF0538865}"/>
-              </a:ext>
-            </a:extLst>
-          </p:cNvPr>
-          <p:cNvGrpSpPr/>
-          <p:nvPr/>
-        </p:nvGrpSpPr>
-        <p:grpSpPr>
-          <a:xfrm>
-            <a:off x="7918999" y="3005291"/>
-            <a:ext cx="725656" cy="619124"/>
-            <a:chOff x="4514222" y="2662237"/>
-            <a:chExt cx="725656" cy="619124"/>
-          </a:xfrm>
-        </p:grpSpPr>
-        <p:sp>
-          <p:nvSpPr>
-            <p:cNvPr id="55" name="Raute 54">
-              <a:extLst>
-                <a:ext uri="{FF2B5EF4-FFF2-40B4-BE49-F238E27FC236}">
-                  <a16:creationId xmlns:a16="http://schemas.microsoft.com/office/drawing/2014/main" id="{0088544E-9F25-DD57-A675-029D49C97834}"/>
-                </a:ext>
-              </a:extLst>
-            </p:cNvPr>
-            <p:cNvSpPr/>
-            <p:nvPr/>
-          </p:nvSpPr>
-          <p:spPr>
-            <a:xfrm>
-              <a:off x="4514222" y="2662237"/>
-              <a:ext cx="725656" cy="619124"/>
-            </a:xfrm>
-            <a:prstGeom prst="diamond">
-              <a:avLst/>
-            </a:prstGeom>
-            <a:solidFill>
-              <a:srgbClr val="FFC000"/>
-            </a:solidFill>
-            <a:ln>
-              <a:solidFill>
-                <a:srgbClr val="FFC000"/>
-              </a:solidFill>
-            </a:ln>
-          </p:spPr>
-          <p:style>
-            <a:lnRef idx="2">
-              <a:schemeClr val="accent1">
-                <a:shade val="50000"/>
-              </a:schemeClr>
-            </a:lnRef>
-            <a:fillRef idx="1">
-              <a:schemeClr val="accent1"/>
-            </a:fillRef>
-            <a:effectRef idx="0">
-              <a:schemeClr val="accent1"/>
-            </a:effectRef>
-            <a:fontRef idx="minor">
-              <a:schemeClr val="lt1"/>
-            </a:fontRef>
-          </p:style>
-          <p:txBody>
-            <a:bodyPr rtlCol="0" anchor="ctr"/>
-            <a:lstStyle/>
-            <a:p>
-              <a:pPr algn="ctr"/>
-              <a:endParaRPr lang="de-DE" sz="800" dirty="0"/>
-            </a:p>
-          </p:txBody>
-        </p:sp>
-        <p:sp>
-          <p:nvSpPr>
-            <p:cNvPr id="56" name="Textfeld 55">
-              <a:extLst>
-                <a:ext uri="{FF2B5EF4-FFF2-40B4-BE49-F238E27FC236}">
-                  <a16:creationId xmlns:a16="http://schemas.microsoft.com/office/drawing/2014/main" id="{E6849999-3897-9C8E-2BF2-DE66A83993D9}"/>
-                </a:ext>
-              </a:extLst>
-            </p:cNvPr>
-            <p:cNvSpPr txBox="1"/>
-            <p:nvPr/>
-          </p:nvSpPr>
-          <p:spPr>
-            <a:xfrm>
-              <a:off x="4600659" y="2856621"/>
-              <a:ext cx="611065" cy="215444"/>
-            </a:xfrm>
-            <a:prstGeom prst="rect">
-              <a:avLst/>
-            </a:prstGeom>
-            <a:noFill/>
-          </p:spPr>
-          <p:txBody>
-            <a:bodyPr wrap="none" rtlCol="0">
-              <a:spAutoFit/>
-            </a:bodyPr>
-            <a:lstStyle/>
-            <a:p>
-              <a:r>
-                <a:rPr lang="de-DE" sz="800" dirty="0"/>
-                <a:t>cc_ec1_es</a:t>
-              </a:r>
-            </a:p>
-          </p:txBody>
-        </p:sp>
-      </p:grpSp>
-      <p:grpSp>
-        <p:nvGrpSpPr>
-          <p:cNvPr id="78" name="Gruppieren 77">
-            <a:extLst>
-              <a:ext uri="{FF2B5EF4-FFF2-40B4-BE49-F238E27FC236}">
-                <a16:creationId xmlns:a16="http://schemas.microsoft.com/office/drawing/2014/main" id="{0D32A9A6-64B9-5FDB-888A-410D6AB6D655}"/>
-              </a:ext>
-            </a:extLst>
-          </p:cNvPr>
-          <p:cNvGrpSpPr/>
-          <p:nvPr/>
-        </p:nvGrpSpPr>
-        <p:grpSpPr>
-          <a:xfrm>
-            <a:off x="2780522" y="1262593"/>
-            <a:ext cx="725656" cy="619124"/>
-            <a:chOff x="4514222" y="2662237"/>
-            <a:chExt cx="725656" cy="619124"/>
-          </a:xfrm>
-        </p:grpSpPr>
-        <p:sp>
-          <p:nvSpPr>
-            <p:cNvPr id="79" name="Raute 78">
-              <a:extLst>
-                <a:ext uri="{FF2B5EF4-FFF2-40B4-BE49-F238E27FC236}">
-                  <a16:creationId xmlns:a16="http://schemas.microsoft.com/office/drawing/2014/main" id="{3E12B7D4-9B52-CFB0-C40E-4B379FC620EB}"/>
-                </a:ext>
-              </a:extLst>
-            </p:cNvPr>
-            <p:cNvSpPr/>
-            <p:nvPr/>
-          </p:nvSpPr>
-          <p:spPr>
-            <a:xfrm>
-              <a:off x="4514222" y="2662237"/>
-              <a:ext cx="725656" cy="619124"/>
-            </a:xfrm>
-            <a:prstGeom prst="diamond">
-              <a:avLst/>
-            </a:prstGeom>
-            <a:solidFill>
-              <a:srgbClr val="FFC000"/>
-            </a:solidFill>
-            <a:ln>
-              <a:solidFill>
-                <a:srgbClr val="FFC000"/>
-              </a:solidFill>
-            </a:ln>
-          </p:spPr>
-          <p:style>
-            <a:lnRef idx="2">
-              <a:schemeClr val="accent1">
-                <a:shade val="50000"/>
-              </a:schemeClr>
-            </a:lnRef>
-            <a:fillRef idx="1">
-              <a:schemeClr val="accent1"/>
-            </a:fillRef>
-            <a:effectRef idx="0">
-              <a:schemeClr val="accent1"/>
-            </a:effectRef>
-            <a:fontRef idx="minor">
-              <a:schemeClr val="lt1"/>
-            </a:fontRef>
-          </p:style>
-          <p:txBody>
-            <a:bodyPr rtlCol="0" anchor="ctr"/>
-            <a:lstStyle/>
-            <a:p>
-              <a:pPr algn="ctr"/>
-              <a:endParaRPr lang="de-DE" sz="800" dirty="0"/>
-            </a:p>
-          </p:txBody>
-        </p:sp>
-        <p:sp>
-          <p:nvSpPr>
-            <p:cNvPr id="80" name="Textfeld 79">
-              <a:extLst>
-                <a:ext uri="{FF2B5EF4-FFF2-40B4-BE49-F238E27FC236}">
-                  <a16:creationId xmlns:a16="http://schemas.microsoft.com/office/drawing/2014/main" id="{182ABF31-05E6-7E04-DEE7-CD80A24708CA}"/>
-                </a:ext>
-              </a:extLst>
-            </p:cNvPr>
-            <p:cNvSpPr txBox="1"/>
-            <p:nvPr/>
-          </p:nvSpPr>
-          <p:spPr>
-            <a:xfrm>
-              <a:off x="4574311" y="2853700"/>
-              <a:ext cx="665567" cy="215444"/>
-            </a:xfrm>
-            <a:prstGeom prst="rect">
-              <a:avLst/>
-            </a:prstGeom>
-            <a:noFill/>
-          </p:spPr>
-          <p:txBody>
-            <a:bodyPr wrap="none" rtlCol="0">
-              <a:spAutoFit/>
-            </a:bodyPr>
-            <a:lstStyle/>
-            <a:p>
-              <a:r>
-                <a:rPr lang="de-DE" sz="800" dirty="0" err="1"/>
-                <a:t>cc_from_to</a:t>
-              </a:r>
-              <a:endParaRPr lang="de-DE" sz="800" dirty="0"/>
-            </a:p>
-          </p:txBody>
-        </p:sp>
+        </p:cxnSp>
       </p:grpSp>
       <p:cxnSp>
         <p:nvCxnSpPr>
-          <p:cNvPr id="86" name="Gerader Verbinder 85">
-            <a:extLst>
-              <a:ext uri="{FF2B5EF4-FFF2-40B4-BE49-F238E27FC236}">
-                <a16:creationId xmlns:a16="http://schemas.microsoft.com/office/drawing/2014/main" id="{4E3BD046-5A83-CC99-8D53-A7A6EFBBD7B9}"/>
+          <p:cNvPr id="33" name="Verbinder: gewinkelt 32">
+            <a:extLst>
+              <a:ext uri="{FF2B5EF4-FFF2-40B4-BE49-F238E27FC236}">
+                <a16:creationId xmlns:a16="http://schemas.microsoft.com/office/drawing/2014/main" id="{2C42E179-99FC-7012-688D-FD349FABD470}"/>
               </a:ext>
             </a:extLst>
           </p:cNvPr>
           <p:cNvCxnSpPr>
-            <a:stCxn id="49" idx="2"/>
-            <a:endCxn id="36" idx="0"/>
+            <a:cxnSpLocks/>
+            <a:stCxn id="30" idx="4"/>
+            <a:endCxn id="45" idx="7"/>
           </p:cNvCxnSpPr>
           <p:nvPr/>
         </p:nvCxnSpPr>
         <p:spPr>
-          <a:xfrm flipH="1">
-            <a:off x="6644718" y="4384346"/>
-            <a:ext cx="3359" cy="402369"/>
+          <a:xfrm rot="5400000">
+            <a:off x="6334943" y="2665845"/>
+            <a:ext cx="3099554" cy="1958654"/>
           </a:xfrm>
-          <a:prstGeom prst="line">
-            <a:avLst/>
+          <a:prstGeom prst="bentConnector3">
+            <a:avLst>
+              <a:gd name="adj1" fmla="val 50000"/>
+            </a:avLst>
           </a:prstGeom>
-          <a:ln w="19050">
-            <a:solidFill>
-              <a:srgbClr val="FFC000"/>
-            </a:solidFill>
-            <a:prstDash val="dash"/>
+          <a:ln w="28575">
+            <a:tailEnd type="triangle"/>
           </a:ln>
         </p:spPr>
         <p:style>
@@ -4991,34 +3724,1043 @@
       </p:cxnSp>
       <p:cxnSp>
         <p:nvCxnSpPr>
-          <p:cNvPr id="87" name="Gerader Verbinder 86">
-            <a:extLst>
-              <a:ext uri="{FF2B5EF4-FFF2-40B4-BE49-F238E27FC236}">
-                <a16:creationId xmlns:a16="http://schemas.microsoft.com/office/drawing/2014/main" id="{A7AEFC3E-6F67-00FE-0EDC-EEA3575ACB67}"/>
+          <p:cNvPr id="34" name="Verbinder: gewinkelt 33">
+            <a:extLst>
+              <a:ext uri="{FF2B5EF4-FFF2-40B4-BE49-F238E27FC236}">
+                <a16:creationId xmlns:a16="http://schemas.microsoft.com/office/drawing/2014/main" id="{8D13B0AF-D3A2-4C19-5693-7BE7C0A56592}"/>
               </a:ext>
             </a:extLst>
           </p:cNvPr>
           <p:cNvCxnSpPr>
             <a:cxnSpLocks/>
-            <a:stCxn id="52" idx="2"/>
-            <a:endCxn id="39" idx="0"/>
+            <a:stCxn id="45" idx="5"/>
+            <a:endCxn id="30" idx="5"/>
+          </p:cNvCxnSpPr>
+          <p:nvPr/>
+        </p:nvCxnSpPr>
+        <p:spPr>
+          <a:xfrm rot="5400000" flipH="1" flipV="1">
+            <a:off x="6389962" y="2554041"/>
+            <a:ext cx="3430515" cy="2399655"/>
+          </a:xfrm>
+          <a:prstGeom prst="bentConnector3">
+            <a:avLst>
+              <a:gd name="adj1" fmla="val -8319"/>
+            </a:avLst>
+          </a:prstGeom>
+          <a:ln w="28575">
+            <a:tailEnd type="triangle"/>
+          </a:ln>
+        </p:spPr>
+        <p:style>
+          <a:lnRef idx="1">
+            <a:schemeClr val="accent1"/>
+          </a:lnRef>
+          <a:fillRef idx="0">
+            <a:schemeClr val="accent1"/>
+          </a:fillRef>
+          <a:effectRef idx="0">
+            <a:schemeClr val="accent1"/>
+          </a:effectRef>
+          <a:fontRef idx="minor">
+            <a:schemeClr val="tx1"/>
+          </a:fontRef>
+        </p:style>
+      </p:cxnSp>
+      <p:sp>
+        <p:nvSpPr>
+          <p:cNvPr id="35" name="Textfeld 34">
+            <a:extLst>
+              <a:ext uri="{FF2B5EF4-FFF2-40B4-BE49-F238E27FC236}">
+                <a16:creationId xmlns:a16="http://schemas.microsoft.com/office/drawing/2014/main" id="{FF786573-D91F-5320-5AEF-74437FFB8E37}"/>
+              </a:ext>
+            </a:extLst>
+          </p:cNvPr>
+          <p:cNvSpPr txBox="1"/>
+          <p:nvPr/>
+        </p:nvSpPr>
+        <p:spPr>
+          <a:xfrm>
+            <a:off x="8288361" y="704850"/>
+            <a:ext cx="1674789" cy="369332"/>
+          </a:xfrm>
+          <a:prstGeom prst="rect">
+            <a:avLst/>
+          </a:prstGeom>
+          <a:noFill/>
+        </p:spPr>
+        <p:txBody>
+          <a:bodyPr wrap="square" rtlCol="0">
+            <a:spAutoFit/>
+          </a:bodyPr>
+          <a:lstStyle/>
+          <a:p>
+            <a:pPr algn="ctr"/>
+            <a:r>
+              <a:rPr lang="de-DE" dirty="0"/>
+              <a:t>ec_1</a:t>
+            </a:r>
+          </a:p>
+        </p:txBody>
+      </p:sp>
+      <p:grpSp>
+        <p:nvGrpSpPr>
+          <p:cNvPr id="36" name="Gruppieren 35">
+            <a:extLst>
+              <a:ext uri="{FF2B5EF4-FFF2-40B4-BE49-F238E27FC236}">
+                <a16:creationId xmlns:a16="http://schemas.microsoft.com/office/drawing/2014/main" id="{29BEF70A-B759-B8D3-881A-3D3C00480D55}"/>
+              </a:ext>
+            </a:extLst>
+          </p:cNvPr>
+          <p:cNvGrpSpPr/>
+          <p:nvPr/>
+        </p:nvGrpSpPr>
+        <p:grpSpPr>
+          <a:xfrm>
+            <a:off x="1617406" y="3866491"/>
+            <a:ext cx="5990222" cy="2797843"/>
+            <a:chOff x="1495425" y="3869656"/>
+            <a:chExt cx="5990222" cy="2797843"/>
+          </a:xfrm>
+        </p:grpSpPr>
+        <p:grpSp>
+          <p:nvGrpSpPr>
+            <p:cNvPr id="37" name="Gruppieren 36">
+              <a:extLst>
+                <a:ext uri="{FF2B5EF4-FFF2-40B4-BE49-F238E27FC236}">
+                  <a16:creationId xmlns:a16="http://schemas.microsoft.com/office/drawing/2014/main" id="{689F9017-EB46-48C7-E9A6-07B8EEE7E22F}"/>
+                </a:ext>
+              </a:extLst>
+            </p:cNvPr>
+            <p:cNvGrpSpPr/>
+            <p:nvPr/>
+          </p:nvGrpSpPr>
+          <p:grpSpPr>
+            <a:xfrm>
+              <a:off x="1495425" y="3869656"/>
+              <a:ext cx="5990222" cy="2797843"/>
+              <a:chOff x="166437" y="3064543"/>
+              <a:chExt cx="8005010" cy="3505200"/>
+            </a:xfrm>
+          </p:grpSpPr>
+          <p:sp>
+            <p:nvSpPr>
+              <p:cNvPr id="39" name="Ellipse 38">
+                <a:extLst>
+                  <a:ext uri="{FF2B5EF4-FFF2-40B4-BE49-F238E27FC236}">
+                    <a16:creationId xmlns:a16="http://schemas.microsoft.com/office/drawing/2014/main" id="{F81104B2-BD09-F786-82DF-39190D5FD886}"/>
+                  </a:ext>
+                </a:extLst>
+              </p:cNvPr>
+              <p:cNvSpPr/>
+              <p:nvPr/>
+            </p:nvSpPr>
+            <p:spPr>
+              <a:xfrm>
+                <a:off x="166437" y="3064543"/>
+                <a:ext cx="8005010" cy="3505200"/>
+              </a:xfrm>
+              <a:prstGeom prst="ellipse">
+                <a:avLst/>
+              </a:prstGeom>
+              <a:noFill/>
+              <a:ln>
+                <a:solidFill>
+                  <a:schemeClr val="tx1"/>
+                </a:solidFill>
+              </a:ln>
+            </p:spPr>
+            <p:style>
+              <a:lnRef idx="2">
+                <a:schemeClr val="accent1">
+                  <a:shade val="50000"/>
+                </a:schemeClr>
+              </a:lnRef>
+              <a:fillRef idx="1">
+                <a:schemeClr val="accent1"/>
+              </a:fillRef>
+              <a:effectRef idx="0">
+                <a:schemeClr val="accent1"/>
+              </a:effectRef>
+              <a:fontRef idx="minor">
+                <a:schemeClr val="lt1"/>
+              </a:fontRef>
+            </p:style>
+            <p:txBody>
+              <a:bodyPr rtlCol="0" anchor="ctr"/>
+              <a:lstStyle/>
+              <a:p>
+                <a:pPr algn="ctr"/>
+                <a:endParaRPr lang="de-DE"/>
+              </a:p>
+            </p:txBody>
+          </p:sp>
+          <p:sp>
+            <p:nvSpPr>
+              <p:cNvPr id="40" name="Trapezoid 39">
+                <a:extLst>
+                  <a:ext uri="{FF2B5EF4-FFF2-40B4-BE49-F238E27FC236}">
+                    <a16:creationId xmlns:a16="http://schemas.microsoft.com/office/drawing/2014/main" id="{4516E5BA-11D0-F11B-D18B-BC80AFF2666E}"/>
+                  </a:ext>
+                </a:extLst>
+              </p:cNvPr>
+              <p:cNvSpPr/>
+              <p:nvPr/>
+            </p:nvSpPr>
+            <p:spPr>
+              <a:xfrm>
+                <a:off x="1257300" y="5521492"/>
+                <a:ext cx="1114926" cy="449179"/>
+              </a:xfrm>
+              <a:prstGeom prst="trapezoid">
+                <a:avLst/>
+              </a:prstGeom>
+            </p:spPr>
+            <p:style>
+              <a:lnRef idx="2">
+                <a:schemeClr val="accent1">
+                  <a:shade val="50000"/>
+                </a:schemeClr>
+              </a:lnRef>
+              <a:fillRef idx="1">
+                <a:schemeClr val="accent1"/>
+              </a:fillRef>
+              <a:effectRef idx="0">
+                <a:schemeClr val="accent1"/>
+              </a:effectRef>
+              <a:fontRef idx="minor">
+                <a:schemeClr val="lt1"/>
+              </a:fontRef>
+            </p:style>
+            <p:txBody>
+              <a:bodyPr rtlCol="0" anchor="ctr"/>
+              <a:lstStyle/>
+              <a:p>
+                <a:pPr algn="ctr"/>
+                <a:r>
+                  <a:rPr lang="de-DE" sz="1200" dirty="0"/>
+                  <a:t>sink</a:t>
+                </a:r>
+              </a:p>
+            </p:txBody>
+          </p:sp>
+          <p:sp>
+            <p:nvSpPr>
+              <p:cNvPr id="41" name="Trapezoid 40">
+                <a:extLst>
+                  <a:ext uri="{FF2B5EF4-FFF2-40B4-BE49-F238E27FC236}">
+                    <a16:creationId xmlns:a16="http://schemas.microsoft.com/office/drawing/2014/main" id="{D936C244-FACF-4A8F-4D1A-DC85F880011B}"/>
+                  </a:ext>
+                </a:extLst>
+              </p:cNvPr>
+              <p:cNvSpPr/>
+              <p:nvPr/>
+            </p:nvSpPr>
+            <p:spPr>
+              <a:xfrm>
+                <a:off x="1257300" y="3835066"/>
+                <a:ext cx="1114926" cy="449179"/>
+              </a:xfrm>
+              <a:prstGeom prst="trapezoid">
+                <a:avLst/>
+              </a:prstGeom>
+              <a:scene3d>
+                <a:camera prst="orthographicFront">
+                  <a:rot lat="0" lon="0" rev="10800000"/>
+                </a:camera>
+                <a:lightRig rig="threePt" dir="t"/>
+              </a:scene3d>
+              <a:sp3d/>
+            </p:spPr>
+            <p:style>
+              <a:lnRef idx="2">
+                <a:schemeClr val="accent1">
+                  <a:shade val="50000"/>
+                </a:schemeClr>
+              </a:lnRef>
+              <a:fillRef idx="1">
+                <a:schemeClr val="accent1"/>
+              </a:fillRef>
+              <a:effectRef idx="0">
+                <a:schemeClr val="accent1"/>
+              </a:effectRef>
+              <a:fontRef idx="minor">
+                <a:schemeClr val="lt1"/>
+              </a:fontRef>
+            </p:style>
+            <p:txBody>
+              <a:bodyPr rtlCol="0" anchor="ctr">
+                <a:flatTx/>
+              </a:bodyPr>
+              <a:lstStyle/>
+              <a:p>
+                <a:pPr algn="ctr"/>
+                <a:r>
+                  <a:rPr lang="de-DE" sz="1200" dirty="0"/>
+                  <a:t>source</a:t>
+                </a:r>
+              </a:p>
+            </p:txBody>
+          </p:sp>
+          <p:sp>
+            <p:nvSpPr>
+              <p:cNvPr id="42" name="Ellipse 41">
+                <a:extLst>
+                  <a:ext uri="{FF2B5EF4-FFF2-40B4-BE49-F238E27FC236}">
+                    <a16:creationId xmlns:a16="http://schemas.microsoft.com/office/drawing/2014/main" id="{5A1F37C8-4985-CA07-5534-ADCD02E580CD}"/>
+                  </a:ext>
+                </a:extLst>
+              </p:cNvPr>
+              <p:cNvSpPr/>
+              <p:nvPr/>
+            </p:nvSpPr>
+            <p:spPr>
+              <a:xfrm>
+                <a:off x="3057525" y="4657725"/>
+                <a:ext cx="1666875" cy="485775"/>
+              </a:xfrm>
+              <a:prstGeom prst="ellipse">
+                <a:avLst/>
+              </a:prstGeom>
+            </p:spPr>
+            <p:style>
+              <a:lnRef idx="2">
+                <a:schemeClr val="accent1">
+                  <a:shade val="50000"/>
+                </a:schemeClr>
+              </a:lnRef>
+              <a:fillRef idx="1">
+                <a:schemeClr val="accent1"/>
+              </a:fillRef>
+              <a:effectRef idx="0">
+                <a:schemeClr val="accent1"/>
+              </a:effectRef>
+              <a:fontRef idx="minor">
+                <a:schemeClr val="lt1"/>
+              </a:fontRef>
+            </p:style>
+            <p:txBody>
+              <a:bodyPr rtlCol="0" anchor="ctr"/>
+              <a:lstStyle/>
+              <a:p>
+                <a:pPr algn="ctr"/>
+                <a:r>
+                  <a:rPr lang="de-DE" sz="1200" dirty="0" err="1"/>
+                  <a:t>bus</a:t>
+                </a:r>
+                <a:endParaRPr lang="de-DE" sz="1200" dirty="0"/>
+              </a:p>
+            </p:txBody>
+          </p:sp>
+          <p:cxnSp>
+            <p:nvCxnSpPr>
+              <p:cNvPr id="43" name="Verbinder: gewinkelt 42">
+                <a:extLst>
+                  <a:ext uri="{FF2B5EF4-FFF2-40B4-BE49-F238E27FC236}">
+                    <a16:creationId xmlns:a16="http://schemas.microsoft.com/office/drawing/2014/main" id="{17A9F1A0-8254-6604-BE75-4EAE9E509D33}"/>
+                  </a:ext>
+                </a:extLst>
+              </p:cNvPr>
+              <p:cNvCxnSpPr>
+                <a:cxnSpLocks/>
+                <a:stCxn id="41" idx="2"/>
+                <a:endCxn id="42" idx="1"/>
+              </p:cNvCxnSpPr>
+              <p:nvPr/>
+            </p:nvCxnSpPr>
+            <p:spPr>
+              <a:xfrm rot="16200000" flipH="1">
+                <a:off x="2335888" y="3763120"/>
+                <a:ext cx="444620" cy="1486870"/>
+              </a:xfrm>
+              <a:prstGeom prst="bentConnector3">
+                <a:avLst/>
+              </a:prstGeom>
+              <a:ln w="28575">
+                <a:tailEnd type="triangle"/>
+              </a:ln>
+            </p:spPr>
+            <p:style>
+              <a:lnRef idx="1">
+                <a:schemeClr val="accent1"/>
+              </a:lnRef>
+              <a:fillRef idx="0">
+                <a:schemeClr val="accent1"/>
+              </a:fillRef>
+              <a:effectRef idx="0">
+                <a:schemeClr val="accent1"/>
+              </a:effectRef>
+              <a:fontRef idx="minor">
+                <a:schemeClr val="tx1"/>
+              </a:fontRef>
+            </p:style>
+          </p:cxnSp>
+          <p:cxnSp>
+            <p:nvCxnSpPr>
+              <p:cNvPr id="44" name="Verbinder: gewinkelt 43">
+                <a:extLst>
+                  <a:ext uri="{FF2B5EF4-FFF2-40B4-BE49-F238E27FC236}">
+                    <a16:creationId xmlns:a16="http://schemas.microsoft.com/office/drawing/2014/main" id="{66E377E9-D996-5A78-49AD-368211946C86}"/>
+                  </a:ext>
+                </a:extLst>
+              </p:cNvPr>
+              <p:cNvCxnSpPr>
+                <a:cxnSpLocks/>
+                <a:stCxn id="42" idx="3"/>
+                <a:endCxn id="40" idx="0"/>
+              </p:cNvCxnSpPr>
+              <p:nvPr/>
+            </p:nvCxnSpPr>
+            <p:spPr>
+              <a:xfrm rot="5400000">
+                <a:off x="2333632" y="4553491"/>
+                <a:ext cx="449132" cy="1486870"/>
+              </a:xfrm>
+              <a:prstGeom prst="bentConnector3">
+                <a:avLst>
+                  <a:gd name="adj1" fmla="val 50000"/>
+                </a:avLst>
+              </a:prstGeom>
+              <a:ln w="28575">
+                <a:tailEnd type="triangle"/>
+              </a:ln>
+            </p:spPr>
+            <p:style>
+              <a:lnRef idx="1">
+                <a:schemeClr val="accent1"/>
+              </a:lnRef>
+              <a:fillRef idx="0">
+                <a:schemeClr val="accent1"/>
+              </a:fillRef>
+              <a:effectRef idx="0">
+                <a:schemeClr val="accent1"/>
+              </a:effectRef>
+              <a:fontRef idx="minor">
+                <a:schemeClr val="tx1"/>
+              </a:fontRef>
+            </p:style>
+          </p:cxnSp>
+          <p:sp>
+            <p:nvSpPr>
+              <p:cNvPr id="45" name="Ellipse 44">
+                <a:extLst>
+                  <a:ext uri="{FF2B5EF4-FFF2-40B4-BE49-F238E27FC236}">
+                    <a16:creationId xmlns:a16="http://schemas.microsoft.com/office/drawing/2014/main" id="{61C106DB-7A7B-554A-8A01-AEE3A2BFE3EB}"/>
+                  </a:ext>
+                </a:extLst>
+              </p:cNvPr>
+              <p:cNvSpPr/>
+              <p:nvPr/>
+            </p:nvSpPr>
+            <p:spPr>
+              <a:xfrm>
+                <a:off x="5810250" y="4657725"/>
+                <a:ext cx="1666875" cy="485775"/>
+              </a:xfrm>
+              <a:prstGeom prst="ellipse">
+                <a:avLst/>
+              </a:prstGeom>
+            </p:spPr>
+            <p:style>
+              <a:lnRef idx="2">
+                <a:schemeClr val="accent1">
+                  <a:shade val="50000"/>
+                </a:schemeClr>
+              </a:lnRef>
+              <a:fillRef idx="1">
+                <a:schemeClr val="accent1"/>
+              </a:fillRef>
+              <a:effectRef idx="0">
+                <a:schemeClr val="accent1"/>
+              </a:effectRef>
+              <a:fontRef idx="minor">
+                <a:schemeClr val="lt1"/>
+              </a:fontRef>
+            </p:style>
+            <p:txBody>
+              <a:bodyPr rtlCol="0" anchor="ctr"/>
+              <a:lstStyle/>
+              <a:p>
+                <a:pPr algn="ctr"/>
+                <a:r>
+                  <a:rPr lang="de-DE" sz="1200" dirty="0" err="1"/>
+                  <a:t>connector</a:t>
+                </a:r>
+                <a:endParaRPr lang="de-DE" sz="1200" dirty="0"/>
+              </a:p>
+              <a:p>
+                <a:pPr algn="ctr"/>
+                <a:r>
+                  <a:rPr lang="de-DE" sz="800" dirty="0"/>
+                  <a:t>(</a:t>
+                </a:r>
+                <a:r>
+                  <a:rPr lang="de-DE" sz="800" dirty="0" err="1"/>
+                  <a:t>bus</a:t>
+                </a:r>
+                <a:r>
+                  <a:rPr lang="de-DE" sz="800" dirty="0"/>
+                  <a:t>)</a:t>
+                </a:r>
+                <a:endParaRPr lang="de-DE" sz="1200" dirty="0"/>
+              </a:p>
+            </p:txBody>
+          </p:sp>
+          <p:cxnSp>
+            <p:nvCxnSpPr>
+              <p:cNvPr id="46" name="Verbinder: gewinkelt 45">
+                <a:extLst>
+                  <a:ext uri="{FF2B5EF4-FFF2-40B4-BE49-F238E27FC236}">
+                    <a16:creationId xmlns:a16="http://schemas.microsoft.com/office/drawing/2014/main" id="{DA33F042-AEFB-4D4D-90E1-12BDD00CB7EA}"/>
+                  </a:ext>
+                </a:extLst>
+              </p:cNvPr>
+              <p:cNvCxnSpPr>
+                <a:cxnSpLocks/>
+                <a:stCxn id="42" idx="7"/>
+                <a:endCxn id="45" idx="1"/>
+              </p:cNvCxnSpPr>
+              <p:nvPr/>
+            </p:nvCxnSpPr>
+            <p:spPr>
+              <a:xfrm rot="5400000" flipH="1" flipV="1">
+                <a:off x="5267325" y="3941832"/>
+                <a:ext cx="12700" cy="1574066"/>
+              </a:xfrm>
+              <a:prstGeom prst="bentConnector3">
+                <a:avLst>
+                  <a:gd name="adj1" fmla="val 2360157"/>
+                </a:avLst>
+              </a:prstGeom>
+              <a:ln w="28575">
+                <a:tailEnd type="triangle"/>
+              </a:ln>
+            </p:spPr>
+            <p:style>
+              <a:lnRef idx="1">
+                <a:schemeClr val="accent1"/>
+              </a:lnRef>
+              <a:fillRef idx="0">
+                <a:schemeClr val="accent1"/>
+              </a:fillRef>
+              <a:effectRef idx="0">
+                <a:schemeClr val="accent1"/>
+              </a:effectRef>
+              <a:fontRef idx="minor">
+                <a:schemeClr val="tx1"/>
+              </a:fontRef>
+            </p:style>
+          </p:cxnSp>
+          <p:cxnSp>
+            <p:nvCxnSpPr>
+              <p:cNvPr id="47" name="Verbinder: gewinkelt 46">
+                <a:extLst>
+                  <a:ext uri="{FF2B5EF4-FFF2-40B4-BE49-F238E27FC236}">
+                    <a16:creationId xmlns:a16="http://schemas.microsoft.com/office/drawing/2014/main" id="{13194561-1462-0FE0-BAB5-2BF016FB551F}"/>
+                  </a:ext>
+                </a:extLst>
+              </p:cNvPr>
+              <p:cNvCxnSpPr>
+                <a:cxnSpLocks/>
+                <a:stCxn id="45" idx="3"/>
+                <a:endCxn id="42" idx="5"/>
+              </p:cNvCxnSpPr>
+              <p:nvPr/>
+            </p:nvCxnSpPr>
+            <p:spPr>
+              <a:xfrm rot="5400000">
+                <a:off x="5267325" y="4285327"/>
+                <a:ext cx="12700" cy="1574066"/>
+              </a:xfrm>
+              <a:prstGeom prst="bentConnector3">
+                <a:avLst>
+                  <a:gd name="adj1" fmla="val 2360157"/>
+                </a:avLst>
+              </a:prstGeom>
+              <a:ln w="28575">
+                <a:tailEnd type="triangle"/>
+              </a:ln>
+            </p:spPr>
+            <p:style>
+              <a:lnRef idx="1">
+                <a:schemeClr val="accent1"/>
+              </a:lnRef>
+              <a:fillRef idx="0">
+                <a:schemeClr val="accent1"/>
+              </a:fillRef>
+              <a:effectRef idx="0">
+                <a:schemeClr val="accent1"/>
+              </a:effectRef>
+              <a:fontRef idx="minor">
+                <a:schemeClr val="tx1"/>
+              </a:fontRef>
+            </p:style>
+          </p:cxnSp>
+        </p:grpSp>
+        <p:sp>
+          <p:nvSpPr>
+            <p:cNvPr id="38" name="Textfeld 37">
+              <a:extLst>
+                <a:ext uri="{FF2B5EF4-FFF2-40B4-BE49-F238E27FC236}">
+                  <a16:creationId xmlns:a16="http://schemas.microsoft.com/office/drawing/2014/main" id="{A03306A1-3A44-DD1F-0854-A5EDA42C5057}"/>
+                </a:ext>
+              </a:extLst>
+            </p:cNvPr>
+            <p:cNvSpPr txBox="1"/>
+            <p:nvPr/>
+          </p:nvSpPr>
+          <p:spPr>
+            <a:xfrm>
+              <a:off x="3516336" y="4115353"/>
+              <a:ext cx="1674789" cy="369332"/>
+            </a:xfrm>
+            <a:prstGeom prst="rect">
+              <a:avLst/>
+            </a:prstGeom>
+            <a:noFill/>
+          </p:spPr>
+          <p:txBody>
+            <a:bodyPr wrap="square" rtlCol="0">
+              <a:spAutoFit/>
+            </a:bodyPr>
+            <a:lstStyle/>
+            <a:p>
+              <a:pPr algn="ctr"/>
+              <a:r>
+                <a:rPr lang="de-DE" dirty="0"/>
+                <a:t>ec_1_1</a:t>
+              </a:r>
+            </a:p>
+          </p:txBody>
+        </p:sp>
+      </p:grpSp>
+    </p:spTree>
+    <p:extLst>
+      <p:ext uri="{BB962C8B-B14F-4D97-AF65-F5344CB8AC3E}">
+        <p14:creationId xmlns:p14="http://schemas.microsoft.com/office/powerpoint/2010/main" val="1966040747"/>
+      </p:ext>
+    </p:extLst>
+  </p:cSld>
+  <p:clrMapOvr>
+    <a:masterClrMapping/>
+  </p:clrMapOvr>
+</p:sld>
+</file>
+
+<file path=ppt/slides/slide2.xml><?xml version="1.0" encoding="utf-8"?>
+<p:sld xmlns:a="http://schemas.openxmlformats.org/drawingml/2006/main" xmlns:r="http://schemas.openxmlformats.org/officeDocument/2006/relationships" xmlns:p="http://schemas.openxmlformats.org/presentationml/2006/main">
+  <p:cSld>
+    <p:spTree>
+      <p:nvGrpSpPr>
+        <p:cNvPr id="1" name=""/>
+        <p:cNvGrpSpPr/>
+        <p:nvPr/>
+      </p:nvGrpSpPr>
+      <p:grpSpPr>
+        <a:xfrm>
+          <a:off x="0" y="0"/>
+          <a:ext cx="0" cy="0"/>
+          <a:chOff x="0" y="0"/>
+          <a:chExt cx="0" cy="0"/>
+        </a:xfrm>
+      </p:grpSpPr>
+      <p:sp>
+        <p:nvSpPr>
+          <p:cNvPr id="2" name="Titel 1">
+            <a:extLst>
+              <a:ext uri="{FF2B5EF4-FFF2-40B4-BE49-F238E27FC236}">
+                <a16:creationId xmlns:a16="http://schemas.microsoft.com/office/drawing/2014/main" id="{ECD1183C-591F-D9B2-8E35-4B2FE0ACABA4}"/>
+              </a:ext>
+            </a:extLst>
+          </p:cNvPr>
+          <p:cNvSpPr>
+            <a:spLocks noGrp="1"/>
+          </p:cNvSpPr>
+          <p:nvPr>
+            <p:ph type="title"/>
+          </p:nvPr>
+        </p:nvSpPr>
+        <p:spPr/>
+        <p:txBody>
+          <a:bodyPr/>
+          <a:lstStyle/>
+          <a:p>
+            <a:r>
+              <a:rPr lang="de-DE" dirty="0" err="1"/>
+              <a:t>Cell</a:t>
+            </a:r>
+            <a:r>
+              <a:rPr lang="de-DE" dirty="0"/>
+              <a:t> Network</a:t>
+            </a:r>
+          </a:p>
+        </p:txBody>
+      </p:sp>
+      <p:sp>
+        <p:nvSpPr>
+          <p:cNvPr id="4" name="Ellipse 3">
+            <a:extLst>
+              <a:ext uri="{FF2B5EF4-FFF2-40B4-BE49-F238E27FC236}">
+                <a16:creationId xmlns:a16="http://schemas.microsoft.com/office/drawing/2014/main" id="{DEBF4BA6-A170-3DB2-5F87-FFFFC981FB01}"/>
+              </a:ext>
+            </a:extLst>
+          </p:cNvPr>
+          <p:cNvSpPr/>
+          <p:nvPr/>
+        </p:nvSpPr>
+        <p:spPr>
+          <a:xfrm>
+            <a:off x="2486025" y="1905000"/>
+            <a:ext cx="6038850" cy="590550"/>
+          </a:xfrm>
+          <a:prstGeom prst="ellipse">
+            <a:avLst/>
+          </a:prstGeom>
+        </p:spPr>
+        <p:style>
+          <a:lnRef idx="2">
+            <a:schemeClr val="accent1">
+              <a:shade val="50000"/>
+            </a:schemeClr>
+          </a:lnRef>
+          <a:fillRef idx="1">
+            <a:schemeClr val="accent1"/>
+          </a:fillRef>
+          <a:effectRef idx="0">
+            <a:schemeClr val="accent1"/>
+          </a:effectRef>
+          <a:fontRef idx="minor">
+            <a:schemeClr val="lt1"/>
+          </a:fontRef>
+        </p:style>
+        <p:txBody>
+          <a:bodyPr rtlCol="0" anchor="ctr"/>
+          <a:lstStyle/>
+          <a:p>
+            <a:pPr algn="ctr"/>
+            <a:r>
+              <a:rPr lang="de-DE" dirty="0"/>
+              <a:t>es</a:t>
+            </a:r>
+          </a:p>
+        </p:txBody>
+      </p:sp>
+      <p:sp>
+        <p:nvSpPr>
+          <p:cNvPr id="5" name="Ellipse 4">
+            <a:extLst>
+              <a:ext uri="{FF2B5EF4-FFF2-40B4-BE49-F238E27FC236}">
+                <a16:creationId xmlns:a16="http://schemas.microsoft.com/office/drawing/2014/main" id="{70F39E1E-349D-0A73-75BF-5C72842DFB7F}"/>
+              </a:ext>
+            </a:extLst>
+          </p:cNvPr>
+          <p:cNvSpPr/>
+          <p:nvPr/>
+        </p:nvSpPr>
+        <p:spPr>
+          <a:xfrm>
+            <a:off x="1276350" y="3429000"/>
+            <a:ext cx="3305175" cy="590550"/>
+          </a:xfrm>
+          <a:prstGeom prst="ellipse">
+            <a:avLst/>
+          </a:prstGeom>
+        </p:spPr>
+        <p:style>
+          <a:lnRef idx="2">
+            <a:schemeClr val="accent1">
+              <a:shade val="50000"/>
+            </a:schemeClr>
+          </a:lnRef>
+          <a:fillRef idx="1">
+            <a:schemeClr val="accent1"/>
+          </a:fillRef>
+          <a:effectRef idx="0">
+            <a:schemeClr val="accent1"/>
+          </a:effectRef>
+          <a:fontRef idx="minor">
+            <a:schemeClr val="lt1"/>
+          </a:fontRef>
+        </p:style>
+        <p:txBody>
+          <a:bodyPr rtlCol="0" anchor="ctr"/>
+          <a:lstStyle/>
+          <a:p>
+            <a:pPr algn="ctr"/>
+            <a:r>
+              <a:rPr lang="de-DE" dirty="0"/>
+              <a:t>ec_1</a:t>
+            </a:r>
+          </a:p>
+        </p:txBody>
+      </p:sp>
+      <p:sp>
+        <p:nvSpPr>
+          <p:cNvPr id="6" name="Ellipse 5">
+            <a:extLst>
+              <a:ext uri="{FF2B5EF4-FFF2-40B4-BE49-F238E27FC236}">
+                <a16:creationId xmlns:a16="http://schemas.microsoft.com/office/drawing/2014/main" id="{1A814B8E-F28F-21F6-40F3-B30233487419}"/>
+              </a:ext>
+            </a:extLst>
+          </p:cNvPr>
+          <p:cNvSpPr/>
+          <p:nvPr/>
+        </p:nvSpPr>
+        <p:spPr>
+          <a:xfrm>
+            <a:off x="6429375" y="3429000"/>
+            <a:ext cx="3305175" cy="590550"/>
+          </a:xfrm>
+          <a:prstGeom prst="ellipse">
+            <a:avLst/>
+          </a:prstGeom>
+        </p:spPr>
+        <p:style>
+          <a:lnRef idx="2">
+            <a:schemeClr val="accent1">
+              <a:shade val="50000"/>
+            </a:schemeClr>
+          </a:lnRef>
+          <a:fillRef idx="1">
+            <a:schemeClr val="accent1"/>
+          </a:fillRef>
+          <a:effectRef idx="0">
+            <a:schemeClr val="accent1"/>
+          </a:effectRef>
+          <a:fontRef idx="minor">
+            <a:schemeClr val="lt1"/>
+          </a:fontRef>
+        </p:style>
+        <p:txBody>
+          <a:bodyPr rtlCol="0" anchor="ctr"/>
+          <a:lstStyle/>
+          <a:p>
+            <a:pPr algn="ctr"/>
+            <a:r>
+              <a:rPr lang="de-DE" dirty="0"/>
+              <a:t>ec_2</a:t>
+            </a:r>
+          </a:p>
+        </p:txBody>
+      </p:sp>
+      <p:sp>
+        <p:nvSpPr>
+          <p:cNvPr id="7" name="Ellipse 6">
+            <a:extLst>
+              <a:ext uri="{FF2B5EF4-FFF2-40B4-BE49-F238E27FC236}">
+                <a16:creationId xmlns:a16="http://schemas.microsoft.com/office/drawing/2014/main" id="{CD07FB36-6134-82AB-6855-7D289C2E456D}"/>
+              </a:ext>
+            </a:extLst>
+          </p:cNvPr>
+          <p:cNvSpPr/>
+          <p:nvPr/>
+        </p:nvSpPr>
+        <p:spPr>
+          <a:xfrm>
+            <a:off x="838200" y="4657725"/>
+            <a:ext cx="1866900" cy="590550"/>
+          </a:xfrm>
+          <a:prstGeom prst="ellipse">
+            <a:avLst/>
+          </a:prstGeom>
+        </p:spPr>
+        <p:style>
+          <a:lnRef idx="2">
+            <a:schemeClr val="accent1">
+              <a:shade val="50000"/>
+            </a:schemeClr>
+          </a:lnRef>
+          <a:fillRef idx="1">
+            <a:schemeClr val="accent1"/>
+          </a:fillRef>
+          <a:effectRef idx="0">
+            <a:schemeClr val="accent1"/>
+          </a:effectRef>
+          <a:fontRef idx="minor">
+            <a:schemeClr val="lt1"/>
+          </a:fontRef>
+        </p:style>
+        <p:txBody>
+          <a:bodyPr rtlCol="0" anchor="ctr"/>
+          <a:lstStyle/>
+          <a:p>
+            <a:pPr algn="ctr"/>
+            <a:r>
+              <a:rPr lang="de-DE" dirty="0"/>
+              <a:t>ec_1_1</a:t>
+            </a:r>
+          </a:p>
+        </p:txBody>
+      </p:sp>
+      <p:sp>
+        <p:nvSpPr>
+          <p:cNvPr id="8" name="Ellipse 7">
+            <a:extLst>
+              <a:ext uri="{FF2B5EF4-FFF2-40B4-BE49-F238E27FC236}">
+                <a16:creationId xmlns:a16="http://schemas.microsoft.com/office/drawing/2014/main" id="{CA972BF9-3B4E-0A88-212A-75F506D5C8BA}"/>
+              </a:ext>
+            </a:extLst>
+          </p:cNvPr>
+          <p:cNvSpPr/>
+          <p:nvPr/>
+        </p:nvSpPr>
+        <p:spPr>
+          <a:xfrm>
+            <a:off x="3171825" y="4657725"/>
+            <a:ext cx="1866900" cy="590550"/>
+          </a:xfrm>
+          <a:prstGeom prst="ellipse">
+            <a:avLst/>
+          </a:prstGeom>
+        </p:spPr>
+        <p:style>
+          <a:lnRef idx="2">
+            <a:schemeClr val="accent1">
+              <a:shade val="50000"/>
+            </a:schemeClr>
+          </a:lnRef>
+          <a:fillRef idx="1">
+            <a:schemeClr val="accent1"/>
+          </a:fillRef>
+          <a:effectRef idx="0">
+            <a:schemeClr val="accent1"/>
+          </a:effectRef>
+          <a:fontRef idx="minor">
+            <a:schemeClr val="lt1"/>
+          </a:fontRef>
+        </p:style>
+        <p:txBody>
+          <a:bodyPr rtlCol="0" anchor="ctr"/>
+          <a:lstStyle/>
+          <a:p>
+            <a:pPr algn="ctr"/>
+            <a:r>
+              <a:rPr lang="de-DE" dirty="0"/>
+              <a:t>ec_1_2</a:t>
+            </a:r>
+          </a:p>
+        </p:txBody>
+      </p:sp>
+      <p:sp>
+        <p:nvSpPr>
+          <p:cNvPr id="9" name="Ellipse 8">
+            <a:extLst>
+              <a:ext uri="{FF2B5EF4-FFF2-40B4-BE49-F238E27FC236}">
+                <a16:creationId xmlns:a16="http://schemas.microsoft.com/office/drawing/2014/main" id="{57C0A867-1C58-3087-D38C-647986F36D8C}"/>
+              </a:ext>
+            </a:extLst>
+          </p:cNvPr>
+          <p:cNvSpPr/>
+          <p:nvPr/>
+        </p:nvSpPr>
+        <p:spPr>
+          <a:xfrm>
+            <a:off x="5981700" y="4657725"/>
+            <a:ext cx="1866900" cy="590550"/>
+          </a:xfrm>
+          <a:prstGeom prst="ellipse">
+            <a:avLst/>
+          </a:prstGeom>
+        </p:spPr>
+        <p:style>
+          <a:lnRef idx="2">
+            <a:schemeClr val="accent1">
+              <a:shade val="50000"/>
+            </a:schemeClr>
+          </a:lnRef>
+          <a:fillRef idx="1">
+            <a:schemeClr val="accent1"/>
+          </a:fillRef>
+          <a:effectRef idx="0">
+            <a:schemeClr val="accent1"/>
+          </a:effectRef>
+          <a:fontRef idx="minor">
+            <a:schemeClr val="lt1"/>
+          </a:fontRef>
+        </p:style>
+        <p:txBody>
+          <a:bodyPr rtlCol="0" anchor="ctr"/>
+          <a:lstStyle/>
+          <a:p>
+            <a:pPr algn="ctr"/>
+            <a:r>
+              <a:rPr lang="de-DE" dirty="0"/>
+              <a:t>ec_2_1</a:t>
+            </a:r>
+          </a:p>
+        </p:txBody>
+      </p:sp>
+      <p:sp>
+        <p:nvSpPr>
+          <p:cNvPr id="10" name="Ellipse 9">
+            <a:extLst>
+              <a:ext uri="{FF2B5EF4-FFF2-40B4-BE49-F238E27FC236}">
+                <a16:creationId xmlns:a16="http://schemas.microsoft.com/office/drawing/2014/main" id="{86A8FB9F-F07B-FAD5-561D-8B12B5314CA1}"/>
+              </a:ext>
+            </a:extLst>
+          </p:cNvPr>
+          <p:cNvSpPr/>
+          <p:nvPr/>
+        </p:nvSpPr>
+        <p:spPr>
+          <a:xfrm>
+            <a:off x="8351682" y="4657725"/>
+            <a:ext cx="1866900" cy="590550"/>
+          </a:xfrm>
+          <a:prstGeom prst="ellipse">
+            <a:avLst/>
+          </a:prstGeom>
+        </p:spPr>
+        <p:style>
+          <a:lnRef idx="2">
+            <a:schemeClr val="accent1">
+              <a:shade val="50000"/>
+            </a:schemeClr>
+          </a:lnRef>
+          <a:fillRef idx="1">
+            <a:schemeClr val="accent1"/>
+          </a:fillRef>
+          <a:effectRef idx="0">
+            <a:schemeClr val="accent1"/>
+          </a:effectRef>
+          <a:fontRef idx="minor">
+            <a:schemeClr val="lt1"/>
+          </a:fontRef>
+        </p:style>
+        <p:txBody>
+          <a:bodyPr rtlCol="0" anchor="ctr"/>
+          <a:lstStyle/>
+          <a:p>
+            <a:pPr algn="ctr"/>
+            <a:r>
+              <a:rPr lang="de-DE" dirty="0"/>
+              <a:t>ec_2_2</a:t>
+            </a:r>
+          </a:p>
+        </p:txBody>
+      </p:sp>
+      <p:cxnSp>
+        <p:nvCxnSpPr>
+          <p:cNvPr id="12" name="Gerader Verbinder 11">
+            <a:extLst>
+              <a:ext uri="{FF2B5EF4-FFF2-40B4-BE49-F238E27FC236}">
+                <a16:creationId xmlns:a16="http://schemas.microsoft.com/office/drawing/2014/main" id="{0A127329-6E87-9E00-C4E4-82547A2C8760}"/>
+              </a:ext>
+            </a:extLst>
+          </p:cNvPr>
+          <p:cNvCxnSpPr>
+            <a:stCxn id="5" idx="3"/>
           </p:cNvCxnSpPr>
           <p:nvPr/>
         </p:nvCxnSpPr>
         <p:spPr>
           <a:xfrm>
-            <a:off x="9789100" y="4018389"/>
-            <a:ext cx="13174" cy="942536"/>
+            <a:off x="1760382" y="3933066"/>
+            <a:ext cx="11268" cy="858009"/>
           </a:xfrm>
           <a:prstGeom prst="line">
             <a:avLst/>
           </a:prstGeom>
-          <a:ln w="19050">
-            <a:solidFill>
-              <a:srgbClr val="FFC000"/>
-            </a:solidFill>
-            <a:prstDash val="dash"/>
-          </a:ln>
         </p:spPr>
         <p:style>
           <a:lnRef idx="1">
@@ -5037,34 +4779,28 @@
       </p:cxnSp>
       <p:cxnSp>
         <p:nvCxnSpPr>
-          <p:cNvPr id="90" name="Gerader Verbinder 89">
-            <a:extLst>
-              <a:ext uri="{FF2B5EF4-FFF2-40B4-BE49-F238E27FC236}">
-                <a16:creationId xmlns:a16="http://schemas.microsoft.com/office/drawing/2014/main" id="{2FDD74F4-9684-481F-BA90-3A519BBE04F2}"/>
+          <p:cNvPr id="13" name="Gerader Verbinder 12">
+            <a:extLst>
+              <a:ext uri="{FF2B5EF4-FFF2-40B4-BE49-F238E27FC236}">
+                <a16:creationId xmlns:a16="http://schemas.microsoft.com/office/drawing/2014/main" id="{2CB2A306-3BCF-594F-5F2D-91B6C312AA43}"/>
               </a:ext>
             </a:extLst>
           </p:cNvPr>
           <p:cNvCxnSpPr>
             <a:cxnSpLocks/>
-            <a:stCxn id="32" idx="2"/>
-            <a:endCxn id="55" idx="0"/>
+            <a:stCxn id="5" idx="5"/>
+            <a:endCxn id="8" idx="0"/>
           </p:cNvCxnSpPr>
           <p:nvPr/>
         </p:nvCxnSpPr>
         <p:spPr>
           <a:xfrm>
-            <a:off x="8281827" y="2624544"/>
-            <a:ext cx="0" cy="380747"/>
+            <a:off x="4097493" y="3933066"/>
+            <a:ext cx="7782" cy="724659"/>
           </a:xfrm>
           <a:prstGeom prst="line">
             <a:avLst/>
           </a:prstGeom>
-          <a:ln w="19050">
-            <a:solidFill>
-              <a:srgbClr val="FFC000"/>
-            </a:solidFill>
-            <a:prstDash val="dash"/>
-          </a:ln>
         </p:spPr>
         <p:style>
           <a:lnRef idx="1">
@@ -5083,33 +4819,28 @@
       </p:cxnSp>
       <p:cxnSp>
         <p:nvCxnSpPr>
-          <p:cNvPr id="93" name="Verbinder: gewinkelt 92">
-            <a:extLst>
-              <a:ext uri="{FF2B5EF4-FFF2-40B4-BE49-F238E27FC236}">
-                <a16:creationId xmlns:a16="http://schemas.microsoft.com/office/drawing/2014/main" id="{F9858F3F-4B0A-C34D-9030-6FD5092E21E6}"/>
+          <p:cNvPr id="16" name="Gerader Verbinder 15">
+            <a:extLst>
+              <a:ext uri="{FF2B5EF4-FFF2-40B4-BE49-F238E27FC236}">
+                <a16:creationId xmlns:a16="http://schemas.microsoft.com/office/drawing/2014/main" id="{DBE76647-E923-074A-438F-534E5366DE94}"/>
               </a:ext>
             </a:extLst>
           </p:cNvPr>
           <p:cNvCxnSpPr>
             <a:cxnSpLocks/>
-            <a:stCxn id="55" idx="1"/>
-            <a:endCxn id="10" idx="0"/>
+            <a:stCxn id="6" idx="3"/>
+            <a:endCxn id="9" idx="0"/>
           </p:cNvCxnSpPr>
           <p:nvPr/>
         </p:nvCxnSpPr>
         <p:spPr>
-          <a:xfrm rot="10800000" flipV="1">
-            <a:off x="5703097" y="3314852"/>
-            <a:ext cx="2215903" cy="685553"/>
+          <a:xfrm>
+            <a:off x="6913407" y="3933066"/>
+            <a:ext cx="1743" cy="724659"/>
           </a:xfrm>
-          <a:prstGeom prst="bentConnector2">
+          <a:prstGeom prst="line">
             <a:avLst/>
           </a:prstGeom>
-          <a:ln w="19050">
-            <a:solidFill>
-              <a:srgbClr val="FFC000"/>
-            </a:solidFill>
-          </a:ln>
         </p:spPr>
         <p:style>
           <a:lnRef idx="1">
@@ -5128,36 +4859,28 @@
       </p:cxnSp>
       <p:cxnSp>
         <p:nvCxnSpPr>
-          <p:cNvPr id="97" name="Verbinder: gewinkelt 96">
-            <a:extLst>
-              <a:ext uri="{FF2B5EF4-FFF2-40B4-BE49-F238E27FC236}">
-                <a16:creationId xmlns:a16="http://schemas.microsoft.com/office/drawing/2014/main" id="{0E9AD3CD-55DA-2253-8BBF-9573F60CD853}"/>
+          <p:cNvPr id="19" name="Gerader Verbinder 18">
+            <a:extLst>
+              <a:ext uri="{FF2B5EF4-FFF2-40B4-BE49-F238E27FC236}">
+                <a16:creationId xmlns:a16="http://schemas.microsoft.com/office/drawing/2014/main" id="{2A9666DF-6281-DF07-3A57-0BBDB2099B30}"/>
               </a:ext>
             </a:extLst>
           </p:cNvPr>
           <p:cNvCxnSpPr>
             <a:cxnSpLocks/>
-            <a:stCxn id="49" idx="1"/>
+            <a:stCxn id="6" idx="5"/>
             <a:endCxn id="10" idx="0"/>
           </p:cNvCxnSpPr>
           <p:nvPr/>
         </p:nvCxnSpPr>
         <p:spPr>
-          <a:xfrm rot="10800000">
-            <a:off x="5703097" y="4000406"/>
-            <a:ext cx="582153" cy="74378"/>
+          <a:xfrm>
+            <a:off x="9250518" y="3933066"/>
+            <a:ext cx="34614" cy="724659"/>
           </a:xfrm>
-          <a:prstGeom prst="bentConnector4">
-            <a:avLst>
-              <a:gd name="adj1" fmla="val 25888"/>
-              <a:gd name="adj2" fmla="val 407349"/>
-            </a:avLst>
+          <a:prstGeom prst="line">
+            <a:avLst/>
           </a:prstGeom>
-          <a:ln w="19050">
-            <a:solidFill>
-              <a:srgbClr val="FFC000"/>
-            </a:solidFill>
-          </a:ln>
         </p:spPr>
         <p:style>
           <a:lnRef idx="1">
@@ -5176,33 +4899,28 @@
       </p:cxnSp>
       <p:cxnSp>
         <p:nvCxnSpPr>
-          <p:cNvPr id="100" name="Verbinder: gewinkelt 99">
-            <a:extLst>
-              <a:ext uri="{FF2B5EF4-FFF2-40B4-BE49-F238E27FC236}">
-                <a16:creationId xmlns:a16="http://schemas.microsoft.com/office/drawing/2014/main" id="{B37F8B1C-C853-A27F-68C7-9C9B683195C3}"/>
+          <p:cNvPr id="23" name="Gerader Verbinder 22">
+            <a:extLst>
+              <a:ext uri="{FF2B5EF4-FFF2-40B4-BE49-F238E27FC236}">
+                <a16:creationId xmlns:a16="http://schemas.microsoft.com/office/drawing/2014/main" id="{E4C52A2D-9B8A-8F9A-A26D-184E4AE04DC8}"/>
               </a:ext>
             </a:extLst>
           </p:cNvPr>
           <p:cNvCxnSpPr>
             <a:cxnSpLocks/>
-            <a:stCxn id="52" idx="1"/>
-            <a:endCxn id="10" idx="0"/>
+            <a:stCxn id="4" idx="3"/>
+            <a:endCxn id="5" idx="0"/>
           </p:cNvCxnSpPr>
           <p:nvPr/>
         </p:nvCxnSpPr>
         <p:spPr>
-          <a:xfrm rot="10800000" flipV="1">
-            <a:off x="5703096" y="3708826"/>
-            <a:ext cx="3723176" cy="291579"/>
+          <a:xfrm flipH="1">
+            <a:off x="2928938" y="2409066"/>
+            <a:ext cx="441456" cy="1019934"/>
           </a:xfrm>
-          <a:prstGeom prst="bentConnector2">
+          <a:prstGeom prst="line">
             <a:avLst/>
           </a:prstGeom>
-          <a:ln w="19050">
-            <a:solidFill>
-              <a:srgbClr val="FFC000"/>
-            </a:solidFill>
-          </a:ln>
         </p:spPr>
         <p:style>
           <a:lnRef idx="1">
@@ -5221,33 +4939,28 @@
       </p:cxnSp>
       <p:cxnSp>
         <p:nvCxnSpPr>
-          <p:cNvPr id="103" name="Verbinder: gewinkelt 102">
-            <a:extLst>
-              <a:ext uri="{FF2B5EF4-FFF2-40B4-BE49-F238E27FC236}">
-                <a16:creationId xmlns:a16="http://schemas.microsoft.com/office/drawing/2014/main" id="{0DCBF3E1-3D5F-D338-4769-AB6215DFFC9C}"/>
+          <p:cNvPr id="26" name="Gerader Verbinder 25">
+            <a:extLst>
+              <a:ext uri="{FF2B5EF4-FFF2-40B4-BE49-F238E27FC236}">
+                <a16:creationId xmlns:a16="http://schemas.microsoft.com/office/drawing/2014/main" id="{DFD19D3B-621A-5388-E3D5-66BD641B349E}"/>
               </a:ext>
             </a:extLst>
           </p:cNvPr>
           <p:cNvCxnSpPr>
             <a:cxnSpLocks/>
-            <a:stCxn id="36" idx="1"/>
-            <a:endCxn id="12" idx="0"/>
+            <a:stCxn id="4" idx="5"/>
+            <a:endCxn id="6" idx="0"/>
           </p:cNvCxnSpPr>
           <p:nvPr/>
         </p:nvCxnSpPr>
         <p:spPr>
-          <a:xfrm rot="10800000" flipV="1">
-            <a:off x="5880688" y="5096276"/>
-            <a:ext cx="401203" cy="597067"/>
+          <a:xfrm>
+            <a:off x="7640506" y="2409066"/>
+            <a:ext cx="441457" cy="1019934"/>
           </a:xfrm>
-          <a:prstGeom prst="bentConnector2">
+          <a:prstGeom prst="line">
             <a:avLst/>
           </a:prstGeom>
-          <a:ln w="19050">
-            <a:solidFill>
-              <a:srgbClr val="FFC000"/>
-            </a:solidFill>
-          </a:ln>
         </p:spPr>
         <p:style>
           <a:lnRef idx="1">
@@ -5264,202 +4977,10 @@
           </a:fontRef>
         </p:style>
       </p:cxnSp>
-      <p:cxnSp>
-        <p:nvCxnSpPr>
-          <p:cNvPr id="106" name="Verbinder: gewinkelt 105">
-            <a:extLst>
-              <a:ext uri="{FF2B5EF4-FFF2-40B4-BE49-F238E27FC236}">
-                <a16:creationId xmlns:a16="http://schemas.microsoft.com/office/drawing/2014/main" id="{6D8C1580-9DAF-B9E5-6D65-89F1DB9BAF38}"/>
-              </a:ext>
-            </a:extLst>
-          </p:cNvPr>
-          <p:cNvCxnSpPr>
-            <a:cxnSpLocks/>
-            <a:stCxn id="39" idx="1"/>
-            <a:endCxn id="11" idx="0"/>
-          </p:cNvCxnSpPr>
-          <p:nvPr/>
-        </p:nvCxnSpPr>
-        <p:spPr>
-          <a:xfrm rot="10800000" flipV="1">
-            <a:off x="9020472" y="5270487"/>
-            <a:ext cx="418975" cy="404310"/>
-          </a:xfrm>
-          <a:prstGeom prst="bentConnector2">
-            <a:avLst/>
-          </a:prstGeom>
-          <a:ln w="19050">
-            <a:solidFill>
-              <a:srgbClr val="FFC000"/>
-            </a:solidFill>
-          </a:ln>
-        </p:spPr>
-        <p:style>
-          <a:lnRef idx="1">
-            <a:schemeClr val="accent1"/>
-          </a:lnRef>
-          <a:fillRef idx="0">
-            <a:schemeClr val="accent1"/>
-          </a:fillRef>
-          <a:effectRef idx="0">
-            <a:schemeClr val="accent1"/>
-          </a:effectRef>
-          <a:fontRef idx="minor">
-            <a:schemeClr val="tx1"/>
-          </a:fontRef>
-        </p:style>
-      </p:cxnSp>
-      <p:cxnSp>
-        <p:nvCxnSpPr>
-          <p:cNvPr id="109" name="Gerader Verbinder 108">
-            <a:extLst>
-              <a:ext uri="{FF2B5EF4-FFF2-40B4-BE49-F238E27FC236}">
-                <a16:creationId xmlns:a16="http://schemas.microsoft.com/office/drawing/2014/main" id="{1153F750-CAC0-7879-8EBF-0040FB4EF29F}"/>
-              </a:ext>
-            </a:extLst>
-          </p:cNvPr>
-          <p:cNvCxnSpPr>
-            <a:cxnSpLocks/>
-          </p:cNvCxnSpPr>
-          <p:nvPr/>
-        </p:nvCxnSpPr>
-        <p:spPr>
-          <a:xfrm flipH="1">
-            <a:off x="3039901" y="2298495"/>
-            <a:ext cx="206899" cy="0"/>
-          </a:xfrm>
-          <a:prstGeom prst="line">
-            <a:avLst/>
-          </a:prstGeom>
-          <a:ln w="19050">
-            <a:solidFill>
-              <a:srgbClr val="FFC000"/>
-            </a:solidFill>
-            <a:prstDash val="dash"/>
-          </a:ln>
-        </p:spPr>
-        <p:style>
-          <a:lnRef idx="1">
-            <a:schemeClr val="accent1"/>
-          </a:lnRef>
-          <a:fillRef idx="0">
-            <a:schemeClr val="accent1"/>
-          </a:fillRef>
-          <a:effectRef idx="0">
-            <a:schemeClr val="accent1"/>
-          </a:effectRef>
-          <a:fontRef idx="minor">
-            <a:schemeClr val="tx1"/>
-          </a:fontRef>
-        </p:style>
-      </p:cxnSp>
-      <p:sp>
-        <p:nvSpPr>
-          <p:cNvPr id="111" name="Textfeld 110">
-            <a:extLst>
-              <a:ext uri="{FF2B5EF4-FFF2-40B4-BE49-F238E27FC236}">
-                <a16:creationId xmlns:a16="http://schemas.microsoft.com/office/drawing/2014/main" id="{CDA1F887-0F06-F609-837F-3713B0D371D4}"/>
-              </a:ext>
-            </a:extLst>
-          </p:cNvPr>
-          <p:cNvSpPr txBox="1"/>
-          <p:nvPr/>
-        </p:nvSpPr>
-        <p:spPr>
-          <a:xfrm>
-            <a:off x="1567964" y="2129218"/>
-            <a:ext cx="1072730" cy="338554"/>
-          </a:xfrm>
-          <a:prstGeom prst="rect">
-            <a:avLst/>
-          </a:prstGeom>
-          <a:noFill/>
-        </p:spPr>
-        <p:txBody>
-          <a:bodyPr wrap="none" rtlCol="0">
-            <a:spAutoFit/>
-          </a:bodyPr>
-          <a:lstStyle/>
-          <a:p>
-            <a:pPr algn="r"/>
-            <a:r>
-              <a:rPr lang="de-DE" sz="800" dirty="0" err="1"/>
-              <a:t>Symmetrically</a:t>
-            </a:r>
-            <a:r>
-              <a:rPr lang="de-DE" sz="800" dirty="0"/>
-              <a:t> </a:t>
-            </a:r>
-            <a:r>
-              <a:rPr lang="de-DE" sz="800" dirty="0" err="1"/>
-              <a:t>linked</a:t>
-            </a:r>
-            <a:r>
-              <a:rPr lang="de-DE" sz="800" dirty="0"/>
-              <a:t> </a:t>
-            </a:r>
-          </a:p>
-          <a:p>
-            <a:pPr algn="r"/>
-            <a:r>
-              <a:rPr lang="de-DE" sz="800" dirty="0" err="1"/>
-              <a:t>flow</a:t>
-            </a:r>
-            <a:r>
-              <a:rPr lang="de-DE" sz="800" dirty="0"/>
-              <a:t> variables</a:t>
-            </a:r>
-          </a:p>
-        </p:txBody>
-      </p:sp>
-      <p:sp>
-        <p:nvSpPr>
-          <p:cNvPr id="112" name="Textfeld 111">
-            <a:extLst>
-              <a:ext uri="{FF2B5EF4-FFF2-40B4-BE49-F238E27FC236}">
-                <a16:creationId xmlns:a16="http://schemas.microsoft.com/office/drawing/2014/main" id="{B7656886-0F33-D169-3C00-6B0E92239B8D}"/>
-              </a:ext>
-            </a:extLst>
-          </p:cNvPr>
-          <p:cNvSpPr txBox="1"/>
-          <p:nvPr/>
-        </p:nvSpPr>
-        <p:spPr>
-          <a:xfrm>
-            <a:off x="1593612" y="1402878"/>
-            <a:ext cx="1021434" cy="338554"/>
-          </a:xfrm>
-          <a:prstGeom prst="rect">
-            <a:avLst/>
-          </a:prstGeom>
-          <a:noFill/>
-        </p:spPr>
-        <p:txBody>
-          <a:bodyPr wrap="none" rtlCol="0">
-            <a:spAutoFit/>
-          </a:bodyPr>
-          <a:lstStyle/>
-          <a:p>
-            <a:pPr algn="r"/>
-            <a:r>
-              <a:rPr lang="de-DE" sz="800" dirty="0" err="1"/>
-              <a:t>CellConnector</a:t>
-            </a:r>
-            <a:endParaRPr lang="de-DE" sz="800" dirty="0"/>
-          </a:p>
-          <a:p>
-            <a:pPr algn="r"/>
-            <a:r>
-              <a:rPr lang="de-DE" sz="800" dirty="0"/>
-              <a:t>(source/sink hybrid)</a:t>
-            </a:r>
-          </a:p>
-        </p:txBody>
-      </p:sp>
     </p:spTree>
     <p:extLst>
       <p:ext uri="{BB962C8B-B14F-4D97-AF65-F5344CB8AC3E}">
-        <p14:creationId xmlns:p14="http://schemas.microsoft.com/office/powerpoint/2010/main" val="849472132"/>
+        <p14:creationId xmlns:p14="http://schemas.microsoft.com/office/powerpoint/2010/main" val="3457492145"/>
       </p:ext>
     </p:extLst>
   </p:cSld>

</xml_diff>